<commit_message>
Sprint #3 Presentation PowerPoint file. Final Version.
</commit_message>
<xml_diff>
--- a/Presentations/Sprint #3 Demo Presentation.pptx
+++ b/Presentations/Sprint #3 Demo Presentation.pptx
@@ -1,24 +1,23 @@
 
 <file path=ppt/presentation.xml><?xml version="1.0" encoding="utf-8"?>
-<p:presentation xmlns:a="http://schemas.openxmlformats.org/drawingml/2006/main" xmlns:r="http://schemas.openxmlformats.org/officeDocument/2006/relationships" xmlns:p="http://schemas.openxmlformats.org/presentationml/2006/main" xmlns:m="http://schemas.openxmlformats.org/officeDocument/2006/math" xmlns:a14="http://schemas.microsoft.com/office/drawing/2010/main">
+<p:presentation xmlns:a="http://schemas.openxmlformats.org/drawingml/2006/main" xmlns:r="http://schemas.openxmlformats.org/officeDocument/2006/relationships" xmlns:p="http://schemas.openxmlformats.org/presentationml/2006/main">
   <p:sldMasterIdLst>
-    <p:sldMasterId id="2147483648" r:id="rId5"/>
+    <p:sldMasterId id="2147483648" r:id="rId1"/>
   </p:sldMasterIdLst>
   <p:notesMasterIdLst>
-    <p:notesMasterId r:id="rId7"/>
+    <p:notesMasterId r:id="rId12"/>
   </p:notesMasterIdLst>
   <p:sldIdLst>
-    <p:sldId id="256" r:id="rId8"/>
-    <p:sldId id="257" r:id="rId9"/>
-    <p:sldId id="258" r:id="rId10"/>
-    <p:sldId id="259" r:id="rId11"/>
-    <p:sldId id="260" r:id="rId12"/>
-    <p:sldId id="261" r:id="rId13"/>
-    <p:sldId id="262" r:id="rId14"/>
-    <p:sldId id="263" r:id="rId15"/>
-    <p:sldId id="264" r:id="rId16"/>
-    <p:sldId id="265" r:id="rId17"/>
-    <p:sldId id="266" r:id="rId18"/>
+    <p:sldId id="256" r:id="rId2"/>
+    <p:sldId id="257" r:id="rId3"/>
+    <p:sldId id="258" r:id="rId4"/>
+    <p:sldId id="259" r:id="rId5"/>
+    <p:sldId id="260" r:id="rId6"/>
+    <p:sldId id="261" r:id="rId7"/>
+    <p:sldId id="262" r:id="rId8"/>
+    <p:sldId id="263" r:id="rId9"/>
+    <p:sldId id="264" r:id="rId10"/>
+    <p:sldId id="265" r:id="rId11"/>
   </p:sldIdLst>
   <p:sldSz cx="13004800" cy="9753600"/>
   <p:notesSz cx="6858000" cy="9144000"/>
@@ -38,7 +37,7 @@
       <a:buFontTx/>
       <a:buNone/>
       <a:tabLst/>
-      <a:defRPr b="0" baseline="0" cap="none" i="0" spc="0" strike="noStrike" sz="1800" u="none" kumimoji="0" normalizeH="0">
+      <a:defRPr kumimoji="0" sz="1800" b="0" i="0" u="none" strike="noStrike" cap="none" spc="0" normalizeH="0" baseline="0">
         <a:ln>
           <a:noFill/>
         </a:ln>
@@ -64,7 +63,7 @@
       <a:buFontTx/>
       <a:buNone/>
       <a:tabLst/>
-      <a:defRPr b="1" baseline="0" cap="none" i="0" spc="0" strike="noStrike" sz="2400" u="none" kumimoji="0" normalizeH="0">
+      <a:defRPr kumimoji="0" sz="2400" b="1" i="0" u="none" strike="noStrike" cap="none" spc="0" normalizeH="0" baseline="0">
         <a:ln>
           <a:noFill/>
         </a:ln>
@@ -94,7 +93,7 @@
       <a:buFontTx/>
       <a:buNone/>
       <a:tabLst/>
-      <a:defRPr b="1" baseline="0" cap="none" i="0" spc="0" strike="noStrike" sz="2400" u="none" kumimoji="0" normalizeH="0">
+      <a:defRPr kumimoji="0" sz="2400" b="1" i="0" u="none" strike="noStrike" cap="none" spc="0" normalizeH="0" baseline="0">
         <a:ln>
           <a:noFill/>
         </a:ln>
@@ -124,7 +123,7 @@
       <a:buFontTx/>
       <a:buNone/>
       <a:tabLst/>
-      <a:defRPr b="1" baseline="0" cap="none" i="0" spc="0" strike="noStrike" sz="2400" u="none" kumimoji="0" normalizeH="0">
+      <a:defRPr kumimoji="0" sz="2400" b="1" i="0" u="none" strike="noStrike" cap="none" spc="0" normalizeH="0" baseline="0">
         <a:ln>
           <a:noFill/>
         </a:ln>
@@ -154,7 +153,7 @@
       <a:buFontTx/>
       <a:buNone/>
       <a:tabLst/>
-      <a:defRPr b="1" baseline="0" cap="none" i="0" spc="0" strike="noStrike" sz="2400" u="none" kumimoji="0" normalizeH="0">
+      <a:defRPr kumimoji="0" sz="2400" b="1" i="0" u="none" strike="noStrike" cap="none" spc="0" normalizeH="0" baseline="0">
         <a:ln>
           <a:noFill/>
         </a:ln>
@@ -184,7 +183,7 @@
       <a:buFontTx/>
       <a:buNone/>
       <a:tabLst/>
-      <a:defRPr b="1" baseline="0" cap="none" i="0" spc="0" strike="noStrike" sz="2400" u="none" kumimoji="0" normalizeH="0">
+      <a:defRPr kumimoji="0" sz="2400" b="1" i="0" u="none" strike="noStrike" cap="none" spc="0" normalizeH="0" baseline="0">
         <a:ln>
           <a:noFill/>
         </a:ln>
@@ -214,7 +213,7 @@
       <a:buFontTx/>
       <a:buNone/>
       <a:tabLst/>
-      <a:defRPr b="1" baseline="0" cap="none" i="0" spc="0" strike="noStrike" sz="2400" u="none" kumimoji="0" normalizeH="0">
+      <a:defRPr kumimoji="0" sz="2400" b="1" i="0" u="none" strike="noStrike" cap="none" spc="0" normalizeH="0" baseline="0">
         <a:ln>
           <a:noFill/>
         </a:ln>
@@ -244,7 +243,7 @@
       <a:buFontTx/>
       <a:buNone/>
       <a:tabLst/>
-      <a:defRPr b="1" baseline="0" cap="none" i="0" spc="0" strike="noStrike" sz="2400" u="none" kumimoji="0" normalizeH="0">
+      <a:defRPr kumimoji="0" sz="2400" b="1" i="0" u="none" strike="noStrike" cap="none" spc="0" normalizeH="0" baseline="0">
         <a:ln>
           <a:noFill/>
         </a:ln>
@@ -274,7 +273,7 @@
       <a:buFontTx/>
       <a:buNone/>
       <a:tabLst/>
-      <a:defRPr b="1" baseline="0" cap="none" i="0" spc="0" strike="noStrike" sz="2400" u="none" kumimoji="0" normalizeH="0">
+      <a:defRPr kumimoji="0" sz="2400" b="1" i="0" u="none" strike="noStrike" cap="none" spc="0" normalizeH="0" baseline="0">
         <a:ln>
           <a:noFill/>
         </a:ln>
@@ -304,7 +303,7 @@
       <a:buFontTx/>
       <a:buNone/>
       <a:tabLst/>
-      <a:defRPr b="1" baseline="0" cap="none" i="0" spc="0" strike="noStrike" sz="2400" u="none" kumimoji="0" normalizeH="0">
+      <a:defRPr kumimoji="0" sz="2400" b="1" i="0" u="none" strike="noStrike" cap="none" spc="0" normalizeH="0" baseline="0">
         <a:ln>
           <a:noFill/>
         </a:ln>
@@ -323,13 +322,22 @@
 </p:presentation>
 </file>
 
-<file path=ppt/commentAuthors.xml><?xml version="1.0" encoding="utf-8"?>
-<p:cmAuthorLst xmlns:a="http://schemas.openxmlformats.org/drawingml/2006/main" xmlns:r="http://schemas.openxmlformats.org/officeDocument/2006/relationships" xmlns:p="http://schemas.openxmlformats.org/presentationml/2006/main" xmlns:m="http://schemas.openxmlformats.org/officeDocument/2006/math" xmlns:a14="http://schemas.microsoft.com/office/drawing/2010/main"/>
+<file path=ppt/revisionInfo.xml><?xml version="1.0" encoding="utf-8"?>
+<p1510:revInfo xmlns:a="http://schemas.openxmlformats.org/drawingml/2006/main" xmlns:r="http://schemas.openxmlformats.org/officeDocument/2006/relationships" xmlns:p1510="http://schemas.microsoft.com/office/powerpoint/2015/10/main">
+  <p1510:revLst>
+    <p1510:client id="{944262BF-3CF6-415B-8334-A62F9258F838}" v="1" dt="2019-12-17T10:09:54.355"/>
+  </p1510:revLst>
+</p1510:revInfo>
 </file>
 
 <file path=ppt/notesMasters/notesMaster1.xml><?xml version="1.0" encoding="utf-8"?>
-<p:notesMaster xmlns:a="http://schemas.openxmlformats.org/drawingml/2006/main" xmlns:r="http://schemas.openxmlformats.org/officeDocument/2006/relationships" xmlns:p="http://schemas.openxmlformats.org/presentationml/2006/main" xmlns:m="http://schemas.openxmlformats.org/officeDocument/2006/math" xmlns:a14="http://schemas.microsoft.com/office/drawing/2010/main">
+<p:notesMaster xmlns:a="http://schemas.openxmlformats.org/drawingml/2006/main" xmlns:r="http://schemas.openxmlformats.org/officeDocument/2006/relationships" xmlns:p="http://schemas.openxmlformats.org/presentationml/2006/main">
   <p:cSld>
+    <p:bg>
+      <p:bgRef idx="1001">
+        <a:schemeClr val="bg1"/>
+      </p:bgRef>
+    </p:bg>
     <p:spTree>
       <p:nvGrpSpPr>
         <p:cNvPr id="1" name=""/>
@@ -347,7 +355,9 @@
       <p:sp>
         <p:nvSpPr>
           <p:cNvPr id="116" name="Shape 116"/>
-          <p:cNvSpPr/>
+          <p:cNvSpPr>
+            <a:spLocks noGrp="1" noRot="1" noChangeAspect="1"/>
+          </p:cNvSpPr>
           <p:nvPr>
             <p:ph type="sldImg"/>
           </p:nvPr>
@@ -365,14 +375,16 @@
           <a:bodyPr/>
           <a:lstStyle/>
           <a:p>
-            <a:pPr/>
+            <a:endParaRPr/>
           </a:p>
         </p:txBody>
       </p:sp>
       <p:sp>
         <p:nvSpPr>
           <p:cNvPr id="117" name="Shape 117"/>
-          <p:cNvSpPr/>
+          <p:cNvSpPr>
+            <a:spLocks noGrp="1"/>
+          </p:cNvSpPr>
           <p:nvPr>
             <p:ph type="body" sz="quarter" idx="1"/>
           </p:nvPr>
@@ -390,7 +402,7 @@
           <a:bodyPr/>
           <a:lstStyle/>
           <a:p>
-            <a:pPr/>
+            <a:endParaRPr/>
           </a:p>
         </p:txBody>
       </p:sp>
@@ -502,7 +514,7 @@
 </file>
 
 <file path=ppt/slideLayouts/slideLayout1.xml><?xml version="1.0" encoding="utf-8"?>
-<p:sldLayout xmlns:a="http://schemas.openxmlformats.org/drawingml/2006/main" xmlns:r="http://schemas.openxmlformats.org/officeDocument/2006/relationships" xmlns:p="http://schemas.openxmlformats.org/presentationml/2006/main" xmlns:m="http://schemas.openxmlformats.org/officeDocument/2006/math" xmlns:a14="http://schemas.microsoft.com/office/drawing/2010/main" type="title" showMasterSp="1" showMasterPhAnim="1">
+<p:sldLayout xmlns:a="http://schemas.openxmlformats.org/drawingml/2006/main" xmlns:r="http://schemas.openxmlformats.org/officeDocument/2006/relationships" xmlns:p="http://schemas.openxmlformats.org/presentationml/2006/main" type="title">
   <p:cSld name="Titolo e sottotitolo">
     <p:spTree>
       <p:nvGrpSpPr>
@@ -521,7 +533,9 @@
       <p:sp>
         <p:nvSpPr>
           <p:cNvPr id="11" name="Titolo Testo"/>
-          <p:cNvSpPr txBox="1"/>
+          <p:cNvSpPr txBox="1">
+            <a:spLocks noGrp="1"/>
+          </p:cNvSpPr>
           <p:nvPr>
             <p:ph type="title"/>
           </p:nvPr>
@@ -539,7 +553,6 @@
           <a:bodyPr anchor="b"/>
           <a:lstStyle/>
           <a:p>
-            <a:pPr/>
             <a:r>
               <a:t>Titolo Testo</a:t>
             </a:r>
@@ -549,7 +562,9 @@
       <p:sp>
         <p:nvSpPr>
           <p:cNvPr id="12" name="Corpo livello uno…"/>
-          <p:cNvSpPr txBox="1"/>
+          <p:cNvSpPr txBox="1">
+            <a:spLocks noGrp="1"/>
+          </p:cNvSpPr>
           <p:nvPr>
             <p:ph type="body" sz="quarter" idx="1"/>
           </p:nvPr>
@@ -608,7 +623,6 @@
             </a:lvl5pPr>
           </a:lstStyle>
           <a:p>
-            <a:pPr/>
             <a:r>
               <a:t>Corpo livello uno</a:t>
             </a:r>
@@ -642,7 +656,9 @@
       <p:sp>
         <p:nvSpPr>
           <p:cNvPr id="13" name="Numero diapositiva"/>
-          <p:cNvSpPr txBox="1"/>
+          <p:cNvSpPr txBox="1">
+            <a:spLocks noGrp="1"/>
+          </p:cNvSpPr>
           <p:nvPr>
             <p:ph type="sldNum" sz="quarter" idx="2"/>
           </p:nvPr>
@@ -665,8 +681,10 @@
             </a:lvl1pPr>
           </a:lstStyle>
           <a:p>
-            <a:pPr/>
-            <a:fld id="{86CB4B4D-7CA3-9044-876B-883B54F8677D}" type="slidenum"/>
+            <a:fld id="{86CB4B4D-7CA3-9044-876B-883B54F8677D}" type="slidenum">
+              <a:t>‹N›</a:t>
+            </a:fld>
+            <a:endParaRPr/>
           </a:p>
         </p:txBody>
       </p:sp>
@@ -675,12 +693,12 @@
   <p:clrMapOvr>
     <a:masterClrMapping/>
   </p:clrMapOvr>
-  <p:transition xmlns:p14="http://schemas.microsoft.com/office/powerpoint/2010/main" spd="med" advClick="1"/>
+  <p:transition spd="med"/>
 </p:sldLayout>
 </file>
 
 <file path=ppt/slideLayouts/slideLayout10.xml><?xml version="1.0" encoding="utf-8"?>
-<p:sldLayout xmlns:a="http://schemas.openxmlformats.org/drawingml/2006/main" xmlns:r="http://schemas.openxmlformats.org/officeDocument/2006/relationships" xmlns:p="http://schemas.openxmlformats.org/presentationml/2006/main" xmlns:m="http://schemas.openxmlformats.org/officeDocument/2006/math" xmlns:a14="http://schemas.microsoft.com/office/drawing/2010/main" type="tx" showMasterSp="1" showMasterPhAnim="1">
+<p:sldLayout xmlns:a="http://schemas.openxmlformats.org/drawingml/2006/main" xmlns:r="http://schemas.openxmlformats.org/officeDocument/2006/relationships" xmlns:p="http://schemas.openxmlformats.org/presentationml/2006/main" type="tx">
   <p:cSld name="Citazione">
     <p:spTree>
       <p:nvGrpSpPr>
@@ -699,7 +717,9 @@
       <p:sp>
         <p:nvSpPr>
           <p:cNvPr id="93" name="–Giovanni Mela"/>
-          <p:cNvSpPr txBox="1"/>
+          <p:cNvSpPr txBox="1">
+            <a:spLocks noGrp="1"/>
+          </p:cNvSpPr>
           <p:nvPr>
             <p:ph type="body" sz="quarter" idx="13"/>
           </p:nvPr>
@@ -724,11 +744,10 @@
               </a:spcBef>
               <a:buSzTx/>
               <a:buNone/>
-              <a:defRPr i="1" sz="2400"/>
+              <a:defRPr sz="2400" i="1"/>
             </a:lvl1pPr>
           </a:lstStyle>
           <a:p>
-            <a:pPr/>
             <a:r>
               <a:t>–Giovanni Mela</a:t>
             </a:r>
@@ -738,7 +757,9 @@
       <p:sp>
         <p:nvSpPr>
           <p:cNvPr id="94" name="“Inserisci qui una citazione”."/>
-          <p:cNvSpPr txBox="1"/>
+          <p:cNvSpPr txBox="1">
+            <a:spLocks noGrp="1"/>
+          </p:cNvSpPr>
           <p:nvPr>
             <p:ph type="body" sz="quarter" idx="14"/>
           </p:nvPr>
@@ -772,7 +793,6 @@
             </a:lvl1pPr>
           </a:lstStyle>
           <a:p>
-            <a:pPr/>
             <a:r>
               <a:t>“Inserisci qui una citazione”. </a:t>
             </a:r>
@@ -782,7 +802,9 @@
       <p:sp>
         <p:nvSpPr>
           <p:cNvPr id="95" name="Numero diapositiva"/>
-          <p:cNvSpPr txBox="1"/>
+          <p:cNvSpPr txBox="1">
+            <a:spLocks noGrp="1"/>
+          </p:cNvSpPr>
           <p:nvPr>
             <p:ph type="sldNum" sz="quarter" idx="2"/>
           </p:nvPr>
@@ -796,8 +818,10 @@
           <a:bodyPr/>
           <a:lstStyle/>
           <a:p>
-            <a:pPr/>
-            <a:fld id="{86CB4B4D-7CA3-9044-876B-883B54F8677D}" type="slidenum"/>
+            <a:fld id="{86CB4B4D-7CA3-9044-876B-883B54F8677D}" type="slidenum">
+              <a:t>‹N›</a:t>
+            </a:fld>
+            <a:endParaRPr/>
           </a:p>
         </p:txBody>
       </p:sp>
@@ -806,12 +830,12 @@
   <p:clrMapOvr>
     <a:masterClrMapping/>
   </p:clrMapOvr>
-  <p:transition xmlns:p14="http://schemas.microsoft.com/office/powerpoint/2010/main" spd="med" advClick="1"/>
+  <p:transition spd="med"/>
 </p:sldLayout>
 </file>
 
 <file path=ppt/slideLayouts/slideLayout11.xml><?xml version="1.0" encoding="utf-8"?>
-<p:sldLayout xmlns:a="http://schemas.openxmlformats.org/drawingml/2006/main" xmlns:r="http://schemas.openxmlformats.org/officeDocument/2006/relationships" xmlns:p="http://schemas.openxmlformats.org/presentationml/2006/main" xmlns:m="http://schemas.openxmlformats.org/officeDocument/2006/math" xmlns:a14="http://schemas.microsoft.com/office/drawing/2010/main" type="tx" showMasterSp="1" showMasterPhAnim="1">
+<p:sldLayout xmlns:a="http://schemas.openxmlformats.org/drawingml/2006/main" xmlns:r="http://schemas.openxmlformats.org/officeDocument/2006/relationships" xmlns:p="http://schemas.openxmlformats.org/presentationml/2006/main" type="tx">
   <p:cSld name="Foto">
     <p:spTree>
       <p:nvGrpSpPr>
@@ -830,7 +854,9 @@
       <p:sp>
         <p:nvSpPr>
           <p:cNvPr id="102" name="Immagine"/>
-          <p:cNvSpPr/>
+          <p:cNvSpPr>
+            <a:spLocks noGrp="1"/>
+          </p:cNvSpPr>
           <p:nvPr>
             <p:ph type="pic" idx="13"/>
           </p:nvPr>
@@ -850,14 +876,16 @@
           </a:bodyPr>
           <a:lstStyle/>
           <a:p>
-            <a:pPr/>
+            <a:endParaRPr/>
           </a:p>
         </p:txBody>
       </p:sp>
       <p:sp>
         <p:nvSpPr>
           <p:cNvPr id="103" name="Numero diapositiva"/>
-          <p:cNvSpPr txBox="1"/>
+          <p:cNvSpPr txBox="1">
+            <a:spLocks noGrp="1"/>
+          </p:cNvSpPr>
           <p:nvPr>
             <p:ph type="sldNum" sz="quarter" idx="2"/>
           </p:nvPr>
@@ -871,8 +899,10 @@
           <a:bodyPr/>
           <a:lstStyle/>
           <a:p>
-            <a:pPr/>
-            <a:fld id="{86CB4B4D-7CA3-9044-876B-883B54F8677D}" type="slidenum"/>
+            <a:fld id="{86CB4B4D-7CA3-9044-876B-883B54F8677D}" type="slidenum">
+              <a:t>‹N›</a:t>
+            </a:fld>
+            <a:endParaRPr/>
           </a:p>
         </p:txBody>
       </p:sp>
@@ -881,12 +911,12 @@
   <p:clrMapOvr>
     <a:masterClrMapping/>
   </p:clrMapOvr>
-  <p:transition xmlns:p14="http://schemas.microsoft.com/office/powerpoint/2010/main" spd="med" advClick="1"/>
+  <p:transition spd="med"/>
 </p:sldLayout>
 </file>
 
 <file path=ppt/slideLayouts/slideLayout12.xml><?xml version="1.0" encoding="utf-8"?>
-<p:sldLayout xmlns:a="http://schemas.openxmlformats.org/drawingml/2006/main" xmlns:r="http://schemas.openxmlformats.org/officeDocument/2006/relationships" xmlns:p="http://schemas.openxmlformats.org/presentationml/2006/main" xmlns:m="http://schemas.openxmlformats.org/officeDocument/2006/math" xmlns:a14="http://schemas.microsoft.com/office/drawing/2010/main" type="tx" showMasterSp="1" showMasterPhAnim="1">
+<p:sldLayout xmlns:a="http://schemas.openxmlformats.org/drawingml/2006/main" xmlns:r="http://schemas.openxmlformats.org/officeDocument/2006/relationships" xmlns:p="http://schemas.openxmlformats.org/presentationml/2006/main" type="tx">
   <p:cSld name="Vuoto">
     <p:spTree>
       <p:nvGrpSpPr>
@@ -905,7 +935,9 @@
       <p:sp>
         <p:nvSpPr>
           <p:cNvPr id="110" name="Numero diapositiva"/>
-          <p:cNvSpPr txBox="1"/>
+          <p:cNvSpPr txBox="1">
+            <a:spLocks noGrp="1"/>
+          </p:cNvSpPr>
           <p:nvPr>
             <p:ph type="sldNum" sz="quarter" idx="2"/>
           </p:nvPr>
@@ -919,8 +951,10 @@
           <a:bodyPr/>
           <a:lstStyle/>
           <a:p>
-            <a:pPr/>
-            <a:fld id="{86CB4B4D-7CA3-9044-876B-883B54F8677D}" type="slidenum"/>
+            <a:fld id="{86CB4B4D-7CA3-9044-876B-883B54F8677D}" type="slidenum">
+              <a:t>‹N›</a:t>
+            </a:fld>
+            <a:endParaRPr/>
           </a:p>
         </p:txBody>
       </p:sp>
@@ -929,12 +963,12 @@
   <p:clrMapOvr>
     <a:masterClrMapping/>
   </p:clrMapOvr>
-  <p:transition xmlns:p14="http://schemas.microsoft.com/office/powerpoint/2010/main" spd="med" advClick="1"/>
+  <p:transition spd="med"/>
 </p:sldLayout>
 </file>
 
 <file path=ppt/slideLayouts/slideLayout2.xml><?xml version="1.0" encoding="utf-8"?>
-<p:sldLayout xmlns:a="http://schemas.openxmlformats.org/drawingml/2006/main" xmlns:r="http://schemas.openxmlformats.org/officeDocument/2006/relationships" xmlns:p="http://schemas.openxmlformats.org/presentationml/2006/main" xmlns:m="http://schemas.openxmlformats.org/officeDocument/2006/math" xmlns:a14="http://schemas.microsoft.com/office/drawing/2010/main" type="tx" showMasterSp="1" showMasterPhAnim="1">
+<p:sldLayout xmlns:a="http://schemas.openxmlformats.org/drawingml/2006/main" xmlns:r="http://schemas.openxmlformats.org/officeDocument/2006/relationships" xmlns:p="http://schemas.openxmlformats.org/presentationml/2006/main" type="tx">
   <p:cSld name="Foto - Orizzontale">
     <p:spTree>
       <p:nvGrpSpPr>
@@ -953,7 +987,9 @@
       <p:sp>
         <p:nvSpPr>
           <p:cNvPr id="20" name="Immagine"/>
-          <p:cNvSpPr/>
+          <p:cNvSpPr>
+            <a:spLocks noGrp="1"/>
+          </p:cNvSpPr>
           <p:nvPr>
             <p:ph type="pic" idx="13"/>
           </p:nvPr>
@@ -973,14 +1009,16 @@
           </a:bodyPr>
           <a:lstStyle/>
           <a:p>
-            <a:pPr/>
+            <a:endParaRPr/>
           </a:p>
         </p:txBody>
       </p:sp>
       <p:sp>
         <p:nvSpPr>
           <p:cNvPr id="21" name="Titolo Testo"/>
-          <p:cNvSpPr txBox="1"/>
+          <p:cNvSpPr txBox="1">
+            <a:spLocks noGrp="1"/>
+          </p:cNvSpPr>
           <p:nvPr>
             <p:ph type="title"/>
           </p:nvPr>
@@ -998,7 +1036,6 @@
           <a:bodyPr anchor="b"/>
           <a:lstStyle/>
           <a:p>
-            <a:pPr/>
             <a:r>
               <a:t>Titolo Testo</a:t>
             </a:r>
@@ -1008,7 +1045,9 @@
       <p:sp>
         <p:nvSpPr>
           <p:cNvPr id="22" name="Corpo livello uno…"/>
-          <p:cNvSpPr txBox="1"/>
+          <p:cNvSpPr txBox="1">
+            <a:spLocks noGrp="1"/>
+          </p:cNvSpPr>
           <p:nvPr>
             <p:ph type="body" sz="quarter" idx="1"/>
           </p:nvPr>
@@ -1067,7 +1106,6 @@
             </a:lvl5pPr>
           </a:lstStyle>
           <a:p>
-            <a:pPr/>
             <a:r>
               <a:t>Corpo livello uno</a:t>
             </a:r>
@@ -1101,7 +1139,9 @@
       <p:sp>
         <p:nvSpPr>
           <p:cNvPr id="23" name="Numero diapositiva"/>
-          <p:cNvSpPr txBox="1"/>
+          <p:cNvSpPr txBox="1">
+            <a:spLocks noGrp="1"/>
+          </p:cNvSpPr>
           <p:nvPr>
             <p:ph type="sldNum" sz="quarter" idx="2"/>
           </p:nvPr>
@@ -1115,8 +1155,10 @@
           <a:bodyPr/>
           <a:lstStyle/>
           <a:p>
-            <a:pPr/>
-            <a:fld id="{86CB4B4D-7CA3-9044-876B-883B54F8677D}" type="slidenum"/>
+            <a:fld id="{86CB4B4D-7CA3-9044-876B-883B54F8677D}" type="slidenum">
+              <a:t>‹N›</a:t>
+            </a:fld>
+            <a:endParaRPr/>
           </a:p>
         </p:txBody>
       </p:sp>
@@ -1125,12 +1167,12 @@
   <p:clrMapOvr>
     <a:masterClrMapping/>
   </p:clrMapOvr>
-  <p:transition xmlns:p14="http://schemas.microsoft.com/office/powerpoint/2010/main" spd="med" advClick="1"/>
+  <p:transition spd="med"/>
 </p:sldLayout>
 </file>
 
 <file path=ppt/slideLayouts/slideLayout3.xml><?xml version="1.0" encoding="utf-8"?>
-<p:sldLayout xmlns:a="http://schemas.openxmlformats.org/drawingml/2006/main" xmlns:r="http://schemas.openxmlformats.org/officeDocument/2006/relationships" xmlns:p="http://schemas.openxmlformats.org/presentationml/2006/main" xmlns:m="http://schemas.openxmlformats.org/officeDocument/2006/math" xmlns:a14="http://schemas.microsoft.com/office/drawing/2010/main" type="tx" showMasterSp="1" showMasterPhAnim="1">
+<p:sldLayout xmlns:a="http://schemas.openxmlformats.org/drawingml/2006/main" xmlns:r="http://schemas.openxmlformats.org/officeDocument/2006/relationships" xmlns:p="http://schemas.openxmlformats.org/presentationml/2006/main" type="tx">
   <p:cSld name="Titolo - Centrato">
     <p:spTree>
       <p:nvGrpSpPr>
@@ -1149,7 +1191,9 @@
       <p:sp>
         <p:nvSpPr>
           <p:cNvPr id="30" name="Titolo Testo"/>
-          <p:cNvSpPr txBox="1"/>
+          <p:cNvSpPr txBox="1">
+            <a:spLocks noGrp="1"/>
+          </p:cNvSpPr>
           <p:nvPr>
             <p:ph type="title"/>
           </p:nvPr>
@@ -1167,7 +1211,6 @@
           <a:bodyPr/>
           <a:lstStyle/>
           <a:p>
-            <a:pPr/>
             <a:r>
               <a:t>Titolo Testo</a:t>
             </a:r>
@@ -1177,7 +1220,9 @@
       <p:sp>
         <p:nvSpPr>
           <p:cNvPr id="31" name="Numero diapositiva"/>
-          <p:cNvSpPr txBox="1"/>
+          <p:cNvSpPr txBox="1">
+            <a:spLocks noGrp="1"/>
+          </p:cNvSpPr>
           <p:nvPr>
             <p:ph type="sldNum" sz="quarter" idx="2"/>
           </p:nvPr>
@@ -1191,8 +1236,10 @@
           <a:bodyPr/>
           <a:lstStyle/>
           <a:p>
-            <a:pPr/>
-            <a:fld id="{86CB4B4D-7CA3-9044-876B-883B54F8677D}" type="slidenum"/>
+            <a:fld id="{86CB4B4D-7CA3-9044-876B-883B54F8677D}" type="slidenum">
+              <a:t>‹N›</a:t>
+            </a:fld>
+            <a:endParaRPr/>
           </a:p>
         </p:txBody>
       </p:sp>
@@ -1201,12 +1248,12 @@
   <p:clrMapOvr>
     <a:masterClrMapping/>
   </p:clrMapOvr>
-  <p:transition xmlns:p14="http://schemas.microsoft.com/office/powerpoint/2010/main" spd="med" advClick="1"/>
+  <p:transition spd="med"/>
 </p:sldLayout>
 </file>
 
 <file path=ppt/slideLayouts/slideLayout4.xml><?xml version="1.0" encoding="utf-8"?>
-<p:sldLayout xmlns:a="http://schemas.openxmlformats.org/drawingml/2006/main" xmlns:r="http://schemas.openxmlformats.org/officeDocument/2006/relationships" xmlns:p="http://schemas.openxmlformats.org/presentationml/2006/main" xmlns:m="http://schemas.openxmlformats.org/officeDocument/2006/math" xmlns:a14="http://schemas.microsoft.com/office/drawing/2010/main" type="tx" showMasterSp="1" showMasterPhAnim="1">
+<p:sldLayout xmlns:a="http://schemas.openxmlformats.org/drawingml/2006/main" xmlns:r="http://schemas.openxmlformats.org/officeDocument/2006/relationships" xmlns:p="http://schemas.openxmlformats.org/presentationml/2006/main" type="tx">
   <p:cSld name="Foto - Verticale">
     <p:spTree>
       <p:nvGrpSpPr>
@@ -1225,7 +1272,9 @@
       <p:sp>
         <p:nvSpPr>
           <p:cNvPr id="38" name="Immagine"/>
-          <p:cNvSpPr/>
+          <p:cNvSpPr>
+            <a:spLocks noGrp="1"/>
+          </p:cNvSpPr>
           <p:nvPr>
             <p:ph type="pic" idx="13"/>
           </p:nvPr>
@@ -1245,14 +1294,16 @@
           </a:bodyPr>
           <a:lstStyle/>
           <a:p>
-            <a:pPr/>
+            <a:endParaRPr/>
           </a:p>
         </p:txBody>
       </p:sp>
       <p:sp>
         <p:nvSpPr>
           <p:cNvPr id="39" name="Titolo Testo"/>
-          <p:cNvSpPr txBox="1"/>
+          <p:cNvSpPr txBox="1">
+            <a:spLocks noGrp="1"/>
+          </p:cNvSpPr>
           <p:nvPr>
             <p:ph type="title"/>
           </p:nvPr>
@@ -1274,7 +1325,6 @@
             </a:lvl1pPr>
           </a:lstStyle>
           <a:p>
-            <a:pPr/>
             <a:r>
               <a:t>Titolo Testo</a:t>
             </a:r>
@@ -1284,7 +1334,9 @@
       <p:sp>
         <p:nvSpPr>
           <p:cNvPr id="40" name="Corpo livello uno…"/>
-          <p:cNvSpPr txBox="1"/>
+          <p:cNvSpPr txBox="1">
+            <a:spLocks noGrp="1"/>
+          </p:cNvSpPr>
           <p:nvPr>
             <p:ph type="body" sz="quarter" idx="1"/>
           </p:nvPr>
@@ -1343,7 +1395,6 @@
             </a:lvl5pPr>
           </a:lstStyle>
           <a:p>
-            <a:pPr/>
             <a:r>
               <a:t>Corpo livello uno</a:t>
             </a:r>
@@ -1377,7 +1428,9 @@
       <p:sp>
         <p:nvSpPr>
           <p:cNvPr id="41" name="Numero diapositiva"/>
-          <p:cNvSpPr txBox="1"/>
+          <p:cNvSpPr txBox="1">
+            <a:spLocks noGrp="1"/>
+          </p:cNvSpPr>
           <p:nvPr>
             <p:ph type="sldNum" sz="quarter" idx="2"/>
           </p:nvPr>
@@ -1391,8 +1444,10 @@
           <a:bodyPr/>
           <a:lstStyle/>
           <a:p>
-            <a:pPr/>
-            <a:fld id="{86CB4B4D-7CA3-9044-876B-883B54F8677D}" type="slidenum"/>
+            <a:fld id="{86CB4B4D-7CA3-9044-876B-883B54F8677D}" type="slidenum">
+              <a:t>‹N›</a:t>
+            </a:fld>
+            <a:endParaRPr/>
           </a:p>
         </p:txBody>
       </p:sp>
@@ -1401,12 +1456,12 @@
   <p:clrMapOvr>
     <a:masterClrMapping/>
   </p:clrMapOvr>
-  <p:transition xmlns:p14="http://schemas.microsoft.com/office/powerpoint/2010/main" spd="med" advClick="1"/>
+  <p:transition spd="med"/>
 </p:sldLayout>
 </file>
 
 <file path=ppt/slideLayouts/slideLayout5.xml><?xml version="1.0" encoding="utf-8"?>
-<p:sldLayout xmlns:a="http://schemas.openxmlformats.org/drawingml/2006/main" xmlns:r="http://schemas.openxmlformats.org/officeDocument/2006/relationships" xmlns:p="http://schemas.openxmlformats.org/presentationml/2006/main" xmlns:m="http://schemas.openxmlformats.org/officeDocument/2006/math" xmlns:a14="http://schemas.microsoft.com/office/drawing/2010/main" type="tx" showMasterSp="1" showMasterPhAnim="1">
+<p:sldLayout xmlns:a="http://schemas.openxmlformats.org/drawingml/2006/main" xmlns:r="http://schemas.openxmlformats.org/officeDocument/2006/relationships" xmlns:p="http://schemas.openxmlformats.org/presentationml/2006/main" type="tx">
   <p:cSld name="Titolo - In alto">
     <p:spTree>
       <p:nvGrpSpPr>
@@ -1425,7 +1480,9 @@
       <p:sp>
         <p:nvSpPr>
           <p:cNvPr id="48" name="Titolo Testo"/>
-          <p:cNvSpPr txBox="1"/>
+          <p:cNvSpPr txBox="1">
+            <a:spLocks noGrp="1"/>
+          </p:cNvSpPr>
           <p:nvPr>
             <p:ph type="title"/>
           </p:nvPr>
@@ -1439,7 +1496,6 @@
           <a:bodyPr/>
           <a:lstStyle/>
           <a:p>
-            <a:pPr/>
             <a:r>
               <a:t>Titolo Testo</a:t>
             </a:r>
@@ -1449,7 +1505,9 @@
       <p:sp>
         <p:nvSpPr>
           <p:cNvPr id="49" name="Numero diapositiva"/>
-          <p:cNvSpPr txBox="1"/>
+          <p:cNvSpPr txBox="1">
+            <a:spLocks noGrp="1"/>
+          </p:cNvSpPr>
           <p:nvPr>
             <p:ph type="sldNum" sz="quarter" idx="2"/>
           </p:nvPr>
@@ -1463,8 +1521,10 @@
           <a:bodyPr/>
           <a:lstStyle/>
           <a:p>
-            <a:pPr/>
-            <a:fld id="{86CB4B4D-7CA3-9044-876B-883B54F8677D}" type="slidenum"/>
+            <a:fld id="{86CB4B4D-7CA3-9044-876B-883B54F8677D}" type="slidenum">
+              <a:t>‹N›</a:t>
+            </a:fld>
+            <a:endParaRPr/>
           </a:p>
         </p:txBody>
       </p:sp>
@@ -1473,12 +1533,12 @@
   <p:clrMapOvr>
     <a:masterClrMapping/>
   </p:clrMapOvr>
-  <p:transition xmlns:p14="http://schemas.microsoft.com/office/powerpoint/2010/main" spd="med" advClick="1"/>
+  <p:transition spd="med"/>
 </p:sldLayout>
 </file>
 
 <file path=ppt/slideLayouts/slideLayout6.xml><?xml version="1.0" encoding="utf-8"?>
-<p:sldLayout xmlns:a="http://schemas.openxmlformats.org/drawingml/2006/main" xmlns:r="http://schemas.openxmlformats.org/officeDocument/2006/relationships" xmlns:p="http://schemas.openxmlformats.org/presentationml/2006/main" xmlns:m="http://schemas.openxmlformats.org/officeDocument/2006/math" xmlns:a14="http://schemas.microsoft.com/office/drawing/2010/main" type="tx" showMasterSp="1" showMasterPhAnim="1">
+<p:sldLayout xmlns:a="http://schemas.openxmlformats.org/drawingml/2006/main" xmlns:r="http://schemas.openxmlformats.org/officeDocument/2006/relationships" xmlns:p="http://schemas.openxmlformats.org/presentationml/2006/main" type="tx">
   <p:cSld name="Titolo e punti elenco">
     <p:spTree>
       <p:nvGrpSpPr>
@@ -1497,7 +1557,9 @@
       <p:sp>
         <p:nvSpPr>
           <p:cNvPr id="56" name="Titolo Testo"/>
-          <p:cNvSpPr txBox="1"/>
+          <p:cNvSpPr txBox="1">
+            <a:spLocks noGrp="1"/>
+          </p:cNvSpPr>
           <p:nvPr>
             <p:ph type="title"/>
           </p:nvPr>
@@ -1511,7 +1573,6 @@
           <a:bodyPr/>
           <a:lstStyle/>
           <a:p>
-            <a:pPr/>
             <a:r>
               <a:t>Titolo Testo</a:t>
             </a:r>
@@ -1521,7 +1582,9 @@
       <p:sp>
         <p:nvSpPr>
           <p:cNvPr id="57" name="Corpo livello uno…"/>
-          <p:cNvSpPr txBox="1"/>
+          <p:cNvSpPr txBox="1">
+            <a:spLocks noGrp="1"/>
+          </p:cNvSpPr>
           <p:nvPr>
             <p:ph type="body" idx="1"/>
           </p:nvPr>
@@ -1535,7 +1598,6 @@
           <a:bodyPr/>
           <a:lstStyle/>
           <a:p>
-            <a:pPr/>
             <a:r>
               <a:t>Corpo livello uno</a:t>
             </a:r>
@@ -1569,7 +1631,9 @@
       <p:sp>
         <p:nvSpPr>
           <p:cNvPr id="58" name="Numero diapositiva"/>
-          <p:cNvSpPr txBox="1"/>
+          <p:cNvSpPr txBox="1">
+            <a:spLocks noGrp="1"/>
+          </p:cNvSpPr>
           <p:nvPr>
             <p:ph type="sldNum" sz="quarter" idx="2"/>
           </p:nvPr>
@@ -1583,8 +1647,10 @@
           <a:bodyPr/>
           <a:lstStyle/>
           <a:p>
-            <a:pPr/>
-            <a:fld id="{86CB4B4D-7CA3-9044-876B-883B54F8677D}" type="slidenum"/>
+            <a:fld id="{86CB4B4D-7CA3-9044-876B-883B54F8677D}" type="slidenum">
+              <a:t>‹N›</a:t>
+            </a:fld>
+            <a:endParaRPr/>
           </a:p>
         </p:txBody>
       </p:sp>
@@ -1593,12 +1659,12 @@
   <p:clrMapOvr>
     <a:masterClrMapping/>
   </p:clrMapOvr>
-  <p:transition xmlns:p14="http://schemas.microsoft.com/office/powerpoint/2010/main" spd="med" advClick="1"/>
+  <p:transition spd="med"/>
 </p:sldLayout>
 </file>
 
 <file path=ppt/slideLayouts/slideLayout7.xml><?xml version="1.0" encoding="utf-8"?>
-<p:sldLayout xmlns:a="http://schemas.openxmlformats.org/drawingml/2006/main" xmlns:r="http://schemas.openxmlformats.org/officeDocument/2006/relationships" xmlns:p="http://schemas.openxmlformats.org/presentationml/2006/main" xmlns:m="http://schemas.openxmlformats.org/officeDocument/2006/math" xmlns:a14="http://schemas.microsoft.com/office/drawing/2010/main" type="tx" showMasterSp="1" showMasterPhAnim="1">
+<p:sldLayout xmlns:a="http://schemas.openxmlformats.org/drawingml/2006/main" xmlns:r="http://schemas.openxmlformats.org/officeDocument/2006/relationships" xmlns:p="http://schemas.openxmlformats.org/presentationml/2006/main" type="tx">
   <p:cSld name="Titolo, punti elenco e foto">
     <p:spTree>
       <p:nvGrpSpPr>
@@ -1617,7 +1683,9 @@
       <p:sp>
         <p:nvSpPr>
           <p:cNvPr id="65" name="Immagine"/>
-          <p:cNvSpPr/>
+          <p:cNvSpPr>
+            <a:spLocks noGrp="1"/>
+          </p:cNvSpPr>
           <p:nvPr>
             <p:ph type="pic" idx="13"/>
           </p:nvPr>
@@ -1637,14 +1705,16 @@
           </a:bodyPr>
           <a:lstStyle/>
           <a:p>
-            <a:pPr/>
+            <a:endParaRPr/>
           </a:p>
         </p:txBody>
       </p:sp>
       <p:sp>
         <p:nvSpPr>
           <p:cNvPr id="66" name="Titolo Testo"/>
-          <p:cNvSpPr txBox="1"/>
+          <p:cNvSpPr txBox="1">
+            <a:spLocks noGrp="1"/>
+          </p:cNvSpPr>
           <p:nvPr>
             <p:ph type="title"/>
           </p:nvPr>
@@ -1658,7 +1728,6 @@
           <a:bodyPr/>
           <a:lstStyle/>
           <a:p>
-            <a:pPr/>
             <a:r>
               <a:t>Titolo Testo</a:t>
             </a:r>
@@ -1668,7 +1737,9 @@
       <p:sp>
         <p:nvSpPr>
           <p:cNvPr id="67" name="Corpo livello uno…"/>
-          <p:cNvSpPr txBox="1"/>
+          <p:cNvSpPr txBox="1">
+            <a:spLocks noGrp="1"/>
+          </p:cNvSpPr>
           <p:nvPr>
             <p:ph type="body" sz="half" idx="1"/>
           </p:nvPr>
@@ -1717,7 +1788,6 @@
             </a:lvl5pPr>
           </a:lstStyle>
           <a:p>
-            <a:pPr/>
             <a:r>
               <a:t>Corpo livello uno</a:t>
             </a:r>
@@ -1751,7 +1821,9 @@
       <p:sp>
         <p:nvSpPr>
           <p:cNvPr id="68" name="Numero diapositiva"/>
-          <p:cNvSpPr txBox="1"/>
+          <p:cNvSpPr txBox="1">
+            <a:spLocks noGrp="1"/>
+          </p:cNvSpPr>
           <p:nvPr>
             <p:ph type="sldNum" sz="quarter" idx="2"/>
           </p:nvPr>
@@ -1778,8 +1850,10 @@
             </a:lvl1pPr>
           </a:lstStyle>
           <a:p>
-            <a:pPr/>
-            <a:fld id="{86CB4B4D-7CA3-9044-876B-883B54F8677D}" type="slidenum"/>
+            <a:fld id="{86CB4B4D-7CA3-9044-876B-883B54F8677D}" type="slidenum">
+              <a:t>‹N›</a:t>
+            </a:fld>
+            <a:endParaRPr/>
           </a:p>
         </p:txBody>
       </p:sp>
@@ -1788,12 +1862,12 @@
   <p:clrMapOvr>
     <a:masterClrMapping/>
   </p:clrMapOvr>
-  <p:transition xmlns:p14="http://schemas.microsoft.com/office/powerpoint/2010/main" spd="med" advClick="1"/>
+  <p:transition spd="med"/>
 </p:sldLayout>
 </file>
 
 <file path=ppt/slideLayouts/slideLayout8.xml><?xml version="1.0" encoding="utf-8"?>
-<p:sldLayout xmlns:a="http://schemas.openxmlformats.org/drawingml/2006/main" xmlns:r="http://schemas.openxmlformats.org/officeDocument/2006/relationships" xmlns:p="http://schemas.openxmlformats.org/presentationml/2006/main" xmlns:m="http://schemas.openxmlformats.org/officeDocument/2006/math" xmlns:a14="http://schemas.microsoft.com/office/drawing/2010/main" type="tx" showMasterSp="1" showMasterPhAnim="1">
+<p:sldLayout xmlns:a="http://schemas.openxmlformats.org/drawingml/2006/main" xmlns:r="http://schemas.openxmlformats.org/officeDocument/2006/relationships" xmlns:p="http://schemas.openxmlformats.org/presentationml/2006/main" type="tx">
   <p:cSld name="Punti elenco">
     <p:spTree>
       <p:nvGrpSpPr>
@@ -1812,7 +1886,9 @@
       <p:sp>
         <p:nvSpPr>
           <p:cNvPr id="75" name="Corpo livello uno…"/>
-          <p:cNvSpPr txBox="1"/>
+          <p:cNvSpPr txBox="1">
+            <a:spLocks noGrp="1"/>
+          </p:cNvSpPr>
           <p:nvPr>
             <p:ph type="body" idx="1"/>
           </p:nvPr>
@@ -1830,7 +1906,6 @@
           <a:bodyPr/>
           <a:lstStyle/>
           <a:p>
-            <a:pPr/>
             <a:r>
               <a:t>Corpo livello uno</a:t>
             </a:r>
@@ -1864,7 +1939,9 @@
       <p:sp>
         <p:nvSpPr>
           <p:cNvPr id="76" name="Numero diapositiva"/>
-          <p:cNvSpPr txBox="1"/>
+          <p:cNvSpPr txBox="1">
+            <a:spLocks noGrp="1"/>
+          </p:cNvSpPr>
           <p:nvPr>
             <p:ph type="sldNum" sz="quarter" idx="2"/>
           </p:nvPr>
@@ -1878,8 +1955,10 @@
           <a:bodyPr/>
           <a:lstStyle/>
           <a:p>
-            <a:pPr/>
-            <a:fld id="{86CB4B4D-7CA3-9044-876B-883B54F8677D}" type="slidenum"/>
+            <a:fld id="{86CB4B4D-7CA3-9044-876B-883B54F8677D}" type="slidenum">
+              <a:t>‹N›</a:t>
+            </a:fld>
+            <a:endParaRPr/>
           </a:p>
         </p:txBody>
       </p:sp>
@@ -1888,12 +1967,12 @@
   <p:clrMapOvr>
     <a:masterClrMapping/>
   </p:clrMapOvr>
-  <p:transition xmlns:p14="http://schemas.microsoft.com/office/powerpoint/2010/main" spd="med" advClick="1"/>
+  <p:transition spd="med"/>
 </p:sldLayout>
 </file>
 
 <file path=ppt/slideLayouts/slideLayout9.xml><?xml version="1.0" encoding="utf-8"?>
-<p:sldLayout xmlns:a="http://schemas.openxmlformats.org/drawingml/2006/main" xmlns:r="http://schemas.openxmlformats.org/officeDocument/2006/relationships" xmlns:p="http://schemas.openxmlformats.org/presentationml/2006/main" xmlns:m="http://schemas.openxmlformats.org/officeDocument/2006/math" xmlns:a14="http://schemas.microsoft.com/office/drawing/2010/main" type="tx" showMasterSp="1" showMasterPhAnim="1">
+<p:sldLayout xmlns:a="http://schemas.openxmlformats.org/drawingml/2006/main" xmlns:r="http://schemas.openxmlformats.org/officeDocument/2006/relationships" xmlns:p="http://schemas.openxmlformats.org/presentationml/2006/main" type="tx">
   <p:cSld name="Foto - 3 per pagina">
     <p:spTree>
       <p:nvGrpSpPr>
@@ -1912,7 +1991,9 @@
       <p:sp>
         <p:nvSpPr>
           <p:cNvPr id="83" name="Immagine"/>
-          <p:cNvSpPr/>
+          <p:cNvSpPr>
+            <a:spLocks noGrp="1"/>
+          </p:cNvSpPr>
           <p:nvPr>
             <p:ph type="pic" sz="quarter" idx="13"/>
           </p:nvPr>
@@ -1932,14 +2013,16 @@
           </a:bodyPr>
           <a:lstStyle/>
           <a:p>
-            <a:pPr/>
+            <a:endParaRPr/>
           </a:p>
         </p:txBody>
       </p:sp>
       <p:sp>
         <p:nvSpPr>
           <p:cNvPr id="84" name="Immagine"/>
-          <p:cNvSpPr/>
+          <p:cNvSpPr>
+            <a:spLocks noGrp="1"/>
+          </p:cNvSpPr>
           <p:nvPr>
             <p:ph type="pic" sz="quarter" idx="14"/>
           </p:nvPr>
@@ -1959,14 +2042,16 @@
           </a:bodyPr>
           <a:lstStyle/>
           <a:p>
-            <a:pPr/>
+            <a:endParaRPr/>
           </a:p>
         </p:txBody>
       </p:sp>
       <p:sp>
         <p:nvSpPr>
           <p:cNvPr id="85" name="Immagine"/>
-          <p:cNvSpPr/>
+          <p:cNvSpPr>
+            <a:spLocks noGrp="1"/>
+          </p:cNvSpPr>
           <p:nvPr>
             <p:ph type="pic" idx="15"/>
           </p:nvPr>
@@ -1986,14 +2071,16 @@
           </a:bodyPr>
           <a:lstStyle/>
           <a:p>
-            <a:pPr/>
+            <a:endParaRPr/>
           </a:p>
         </p:txBody>
       </p:sp>
       <p:sp>
         <p:nvSpPr>
           <p:cNvPr id="86" name="Numero diapositiva"/>
-          <p:cNvSpPr txBox="1"/>
+          <p:cNvSpPr txBox="1">
+            <a:spLocks noGrp="1"/>
+          </p:cNvSpPr>
           <p:nvPr>
             <p:ph type="sldNum" sz="quarter" idx="2"/>
           </p:nvPr>
@@ -2007,8 +2094,10 @@
           <a:bodyPr/>
           <a:lstStyle/>
           <a:p>
-            <a:pPr/>
-            <a:fld id="{86CB4B4D-7CA3-9044-876B-883B54F8677D}" type="slidenum"/>
+            <a:fld id="{86CB4B4D-7CA3-9044-876B-883B54F8677D}" type="slidenum">
+              <a:t>‹N›</a:t>
+            </a:fld>
+            <a:endParaRPr/>
           </a:p>
         </p:txBody>
       </p:sp>
@@ -2017,18 +2106,19 @@
   <p:clrMapOvr>
     <a:masterClrMapping/>
   </p:clrMapOvr>
-  <p:transition xmlns:p14="http://schemas.microsoft.com/office/powerpoint/2010/main" spd="med" advClick="1"/>
+  <p:transition spd="med"/>
 </p:sldLayout>
 </file>
 
 <file path=ppt/slideMasters/slideMaster1.xml><?xml version="1.0" encoding="utf-8"?>
-<p:sldMaster xmlns:a="http://schemas.openxmlformats.org/drawingml/2006/main" xmlns:r="http://schemas.openxmlformats.org/officeDocument/2006/relationships" xmlns:p="http://schemas.openxmlformats.org/presentationml/2006/main" xmlns:m="http://schemas.openxmlformats.org/officeDocument/2006/math" xmlns:a14="http://schemas.microsoft.com/office/drawing/2010/main">
+<p:sldMaster xmlns:a="http://schemas.openxmlformats.org/drawingml/2006/main" xmlns:r="http://schemas.openxmlformats.org/officeDocument/2006/relationships" xmlns:p="http://schemas.openxmlformats.org/presentationml/2006/main">
   <p:cSld>
     <p:bg>
       <p:bgPr>
         <a:solidFill>
           <a:srgbClr val="FFFFFF"/>
         </a:solidFill>
+        <a:effectLst/>
       </p:bgPr>
     </p:bg>
     <p:spTree>
@@ -2048,7 +2138,9 @@
       <p:sp>
         <p:nvSpPr>
           <p:cNvPr id="2" name="Titolo Testo"/>
-          <p:cNvSpPr txBox="1"/>
+          <p:cNvSpPr txBox="1">
+            <a:spLocks noGrp="1"/>
+          </p:cNvSpPr>
           <p:nvPr>
             <p:ph type="title"/>
           </p:nvPr>
@@ -2066,17 +2158,16 @@
           </a:ln>
           <a:extLst>
             <a:ext uri="{C572A759-6A51-4108-AA02-DFA0A04FC94B}">
-              <ma14:wrappingTextBoxFlag xmlns:ma14="http://schemas.microsoft.com/office/mac/drawingml/2011/main" val="1"/>
+              <ma14:wrappingTextBoxFlag xmlns:ma14="http://schemas.microsoft.com/office/mac/drawingml/2011/main" xmlns:a14="http://schemas.microsoft.com/office/drawing/2010/main" xmlns:m="http://schemas.openxmlformats.org/officeDocument/2006/math" xmlns="" val="1"/>
             </a:ext>
           </a:extLst>
         </p:spPr>
         <p:txBody>
           <a:bodyPr lIns="50800" tIns="50800" rIns="50800" bIns="50800" anchor="ctr">
-            <a:normAutofit fontScale="100000" lnSpcReduction="0"/>
+            <a:normAutofit/>
           </a:bodyPr>
           <a:lstStyle/>
           <a:p>
-            <a:pPr/>
             <a:r>
               <a:t>Titolo Testo</a:t>
             </a:r>
@@ -2086,7 +2177,9 @@
       <p:sp>
         <p:nvSpPr>
           <p:cNvPr id="3" name="Corpo livello uno…"/>
-          <p:cNvSpPr txBox="1"/>
+          <p:cNvSpPr txBox="1">
+            <a:spLocks noGrp="1"/>
+          </p:cNvSpPr>
           <p:nvPr>
             <p:ph type="body" idx="1"/>
           </p:nvPr>
@@ -2104,17 +2197,16 @@
           </a:ln>
           <a:extLst>
             <a:ext uri="{C572A759-6A51-4108-AA02-DFA0A04FC94B}">
-              <ma14:wrappingTextBoxFlag xmlns:ma14="http://schemas.microsoft.com/office/mac/drawingml/2011/main" val="1"/>
+              <ma14:wrappingTextBoxFlag xmlns:ma14="http://schemas.microsoft.com/office/mac/drawingml/2011/main" xmlns:a14="http://schemas.microsoft.com/office/drawing/2010/main" xmlns:m="http://schemas.openxmlformats.org/officeDocument/2006/math" xmlns="" val="1"/>
             </a:ext>
           </a:extLst>
         </p:spPr>
         <p:txBody>
           <a:bodyPr lIns="50800" tIns="50800" rIns="50800" bIns="50800" anchor="ctr">
-            <a:normAutofit fontScale="100000" lnSpcReduction="0"/>
+            <a:normAutofit/>
           </a:bodyPr>
           <a:lstStyle/>
           <a:p>
-            <a:pPr/>
             <a:r>
               <a:t>Corpo livello uno</a:t>
             </a:r>
@@ -2148,7 +2240,9 @@
       <p:sp>
         <p:nvSpPr>
           <p:cNvPr id="4" name="Numero diapositiva"/>
-          <p:cNvSpPr txBox="1"/>
+          <p:cNvSpPr txBox="1">
+            <a:spLocks noGrp="1"/>
+          </p:cNvSpPr>
           <p:nvPr>
             <p:ph type="sldNum" sz="quarter" idx="2"/>
           </p:nvPr>
@@ -2171,7 +2265,7 @@
           </a:bodyPr>
           <a:lstStyle>
             <a:lvl1pPr>
-              <a:defRPr b="0" sz="1600">
+              <a:defRPr sz="1600" b="0">
                 <a:latin typeface="Helvetica Neue Light"/>
                 <a:ea typeface="Helvetica Neue Light"/>
                 <a:cs typeface="Helvetica Neue Light"/>
@@ -2180,8 +2274,10 @@
             </a:lvl1pPr>
           </a:lstStyle>
           <a:p>
-            <a:pPr/>
-            <a:fld id="{86CB4B4D-7CA3-9044-876B-883B54F8677D}" type="slidenum"/>
+            <a:fld id="{86CB4B4D-7CA3-9044-876B-883B54F8677D}" type="slidenum">
+              <a:t>‹N›</a:t>
+            </a:fld>
+            <a:endParaRPr/>
           </a:p>
         </p:txBody>
       </p:sp>
@@ -2189,20 +2285,20 @@
   </p:cSld>
   <p:clrMap bg1="lt1" tx1="dk1" bg2="lt2" tx2="dk2" accent1="accent1" accent2="accent2" accent3="accent3" accent4="accent4" accent5="accent5" accent6="accent6" hlink="hlink" folHlink="folHlink"/>
   <p:sldLayoutIdLst>
-    <p:sldLayoutId id="2147483649" r:id="rId2"/>
-    <p:sldLayoutId id="2147483650" r:id="rId3"/>
-    <p:sldLayoutId id="2147483651" r:id="rId4"/>
-    <p:sldLayoutId id="2147483652" r:id="rId5"/>
-    <p:sldLayoutId id="2147483653" r:id="rId6"/>
-    <p:sldLayoutId id="2147483654" r:id="rId7"/>
-    <p:sldLayoutId id="2147483655" r:id="rId8"/>
-    <p:sldLayoutId id="2147483656" r:id="rId9"/>
-    <p:sldLayoutId id="2147483657" r:id="rId10"/>
-    <p:sldLayoutId id="2147483658" r:id="rId11"/>
-    <p:sldLayoutId id="2147483659" r:id="rId12"/>
-    <p:sldLayoutId id="2147483660" r:id="rId13"/>
+    <p:sldLayoutId id="2147483649" r:id="rId1"/>
+    <p:sldLayoutId id="2147483650" r:id="rId2"/>
+    <p:sldLayoutId id="2147483651" r:id="rId3"/>
+    <p:sldLayoutId id="2147483652" r:id="rId4"/>
+    <p:sldLayoutId id="2147483653" r:id="rId5"/>
+    <p:sldLayoutId id="2147483654" r:id="rId6"/>
+    <p:sldLayoutId id="2147483655" r:id="rId7"/>
+    <p:sldLayoutId id="2147483656" r:id="rId8"/>
+    <p:sldLayoutId id="2147483657" r:id="rId9"/>
+    <p:sldLayoutId id="2147483658" r:id="rId10"/>
+    <p:sldLayoutId id="2147483659" r:id="rId11"/>
+    <p:sldLayoutId id="2147483660" r:id="rId12"/>
   </p:sldLayoutIdLst>
-  <p:transition xmlns:p14="http://schemas.microsoft.com/office/powerpoint/2010/main" spd="med" advClick="1"/>
+  <p:transition spd="med"/>
   <p:txStyles>
     <p:titleStyle>
       <a:lvl1pPr marL="0" marR="0" indent="0" algn="ctr" defTabSz="584200" rtl="0" latinLnBrk="0">
@@ -2220,7 +2316,7 @@
         <a:buFontTx/>
         <a:buNone/>
         <a:tabLst/>
-        <a:defRPr b="0" baseline="0" cap="none" i="0" spc="0" strike="noStrike" sz="8000" u="none">
+        <a:defRPr sz="8000" b="0" i="0" u="none" strike="noStrike" cap="none" spc="0" baseline="0">
           <a:solidFill>
             <a:srgbClr val="000000"/>
           </a:solidFill>
@@ -2246,7 +2342,7 @@
         <a:buFontTx/>
         <a:buNone/>
         <a:tabLst/>
-        <a:defRPr b="0" baseline="0" cap="none" i="0" spc="0" strike="noStrike" sz="8000" u="none">
+        <a:defRPr sz="8000" b="0" i="0" u="none" strike="noStrike" cap="none" spc="0" baseline="0">
           <a:solidFill>
             <a:srgbClr val="000000"/>
           </a:solidFill>
@@ -2272,7 +2368,7 @@
         <a:buFontTx/>
         <a:buNone/>
         <a:tabLst/>
-        <a:defRPr b="0" baseline="0" cap="none" i="0" spc="0" strike="noStrike" sz="8000" u="none">
+        <a:defRPr sz="8000" b="0" i="0" u="none" strike="noStrike" cap="none" spc="0" baseline="0">
           <a:solidFill>
             <a:srgbClr val="000000"/>
           </a:solidFill>
@@ -2298,7 +2394,7 @@
         <a:buFontTx/>
         <a:buNone/>
         <a:tabLst/>
-        <a:defRPr b="0" baseline="0" cap="none" i="0" spc="0" strike="noStrike" sz="8000" u="none">
+        <a:defRPr sz="8000" b="0" i="0" u="none" strike="noStrike" cap="none" spc="0" baseline="0">
           <a:solidFill>
             <a:srgbClr val="000000"/>
           </a:solidFill>
@@ -2324,7 +2420,7 @@
         <a:buFontTx/>
         <a:buNone/>
         <a:tabLst/>
-        <a:defRPr b="0" baseline="0" cap="none" i="0" spc="0" strike="noStrike" sz="8000" u="none">
+        <a:defRPr sz="8000" b="0" i="0" u="none" strike="noStrike" cap="none" spc="0" baseline="0">
           <a:solidFill>
             <a:srgbClr val="000000"/>
           </a:solidFill>
@@ -2350,7 +2446,7 @@
         <a:buFontTx/>
         <a:buNone/>
         <a:tabLst/>
-        <a:defRPr b="0" baseline="0" cap="none" i="0" spc="0" strike="noStrike" sz="8000" u="none">
+        <a:defRPr sz="8000" b="0" i="0" u="none" strike="noStrike" cap="none" spc="0" baseline="0">
           <a:solidFill>
             <a:srgbClr val="000000"/>
           </a:solidFill>
@@ -2376,7 +2472,7 @@
         <a:buFontTx/>
         <a:buNone/>
         <a:tabLst/>
-        <a:defRPr b="0" baseline="0" cap="none" i="0" spc="0" strike="noStrike" sz="8000" u="none">
+        <a:defRPr sz="8000" b="0" i="0" u="none" strike="noStrike" cap="none" spc="0" baseline="0">
           <a:solidFill>
             <a:srgbClr val="000000"/>
           </a:solidFill>
@@ -2402,7 +2498,7 @@
         <a:buFontTx/>
         <a:buNone/>
         <a:tabLst/>
-        <a:defRPr b="0" baseline="0" cap="none" i="0" spc="0" strike="noStrike" sz="8000" u="none">
+        <a:defRPr sz="8000" b="0" i="0" u="none" strike="noStrike" cap="none" spc="0" baseline="0">
           <a:solidFill>
             <a:srgbClr val="000000"/>
           </a:solidFill>
@@ -2428,7 +2524,7 @@
         <a:buFontTx/>
         <a:buNone/>
         <a:tabLst/>
-        <a:defRPr b="0" baseline="0" cap="none" i="0" spc="0" strike="noStrike" sz="8000" u="none">
+        <a:defRPr sz="8000" b="0" i="0" u="none" strike="noStrike" cap="none" spc="0" baseline="0">
           <a:solidFill>
             <a:srgbClr val="000000"/>
           </a:solidFill>
@@ -2456,7 +2552,7 @@
         <a:buFontTx/>
         <a:buChar char="•"/>
         <a:tabLst/>
-        <a:defRPr b="0" baseline="0" cap="none" i="0" spc="0" strike="noStrike" sz="3200" u="none">
+        <a:defRPr sz="3200" b="0" i="0" u="none" strike="noStrike" cap="none" spc="0" baseline="0">
           <a:solidFill>
             <a:srgbClr val="000000"/>
           </a:solidFill>
@@ -2482,7 +2578,7 @@
         <a:buFontTx/>
         <a:buChar char="•"/>
         <a:tabLst/>
-        <a:defRPr b="0" baseline="0" cap="none" i="0" spc="0" strike="noStrike" sz="3200" u="none">
+        <a:defRPr sz="3200" b="0" i="0" u="none" strike="noStrike" cap="none" spc="0" baseline="0">
           <a:solidFill>
             <a:srgbClr val="000000"/>
           </a:solidFill>
@@ -2508,7 +2604,7 @@
         <a:buFontTx/>
         <a:buChar char="•"/>
         <a:tabLst/>
-        <a:defRPr b="0" baseline="0" cap="none" i="0" spc="0" strike="noStrike" sz="3200" u="none">
+        <a:defRPr sz="3200" b="0" i="0" u="none" strike="noStrike" cap="none" spc="0" baseline="0">
           <a:solidFill>
             <a:srgbClr val="000000"/>
           </a:solidFill>
@@ -2534,7 +2630,7 @@
         <a:buFontTx/>
         <a:buChar char="•"/>
         <a:tabLst/>
-        <a:defRPr b="0" baseline="0" cap="none" i="0" spc="0" strike="noStrike" sz="3200" u="none">
+        <a:defRPr sz="3200" b="0" i="0" u="none" strike="noStrike" cap="none" spc="0" baseline="0">
           <a:solidFill>
             <a:srgbClr val="000000"/>
           </a:solidFill>
@@ -2560,7 +2656,7 @@
         <a:buFontTx/>
         <a:buChar char="•"/>
         <a:tabLst/>
-        <a:defRPr b="0" baseline="0" cap="none" i="0" spc="0" strike="noStrike" sz="3200" u="none">
+        <a:defRPr sz="3200" b="0" i="0" u="none" strike="noStrike" cap="none" spc="0" baseline="0">
           <a:solidFill>
             <a:srgbClr val="000000"/>
           </a:solidFill>
@@ -2586,7 +2682,7 @@
         <a:buFontTx/>
         <a:buChar char="•"/>
         <a:tabLst/>
-        <a:defRPr b="0" baseline="0" cap="none" i="0" spc="0" strike="noStrike" sz="3200" u="none">
+        <a:defRPr sz="3200" b="0" i="0" u="none" strike="noStrike" cap="none" spc="0" baseline="0">
           <a:solidFill>
             <a:srgbClr val="000000"/>
           </a:solidFill>
@@ -2612,7 +2708,7 @@
         <a:buFontTx/>
         <a:buChar char="•"/>
         <a:tabLst/>
-        <a:defRPr b="0" baseline="0" cap="none" i="0" spc="0" strike="noStrike" sz="3200" u="none">
+        <a:defRPr sz="3200" b="0" i="0" u="none" strike="noStrike" cap="none" spc="0" baseline="0">
           <a:solidFill>
             <a:srgbClr val="000000"/>
           </a:solidFill>
@@ -2638,7 +2734,7 @@
         <a:buFontTx/>
         <a:buChar char="•"/>
         <a:tabLst/>
-        <a:defRPr b="0" baseline="0" cap="none" i="0" spc="0" strike="noStrike" sz="3200" u="none">
+        <a:defRPr sz="3200" b="0" i="0" u="none" strike="noStrike" cap="none" spc="0" baseline="0">
           <a:solidFill>
             <a:srgbClr val="000000"/>
           </a:solidFill>
@@ -2664,7 +2760,7 @@
         <a:buFontTx/>
         <a:buChar char="•"/>
         <a:tabLst/>
-        <a:defRPr b="0" baseline="0" cap="none" i="0" spc="0" strike="noStrike" sz="3200" u="none">
+        <a:defRPr sz="3200" b="0" i="0" u="none" strike="noStrike" cap="none" spc="0" baseline="0">
           <a:solidFill>
             <a:srgbClr val="000000"/>
           </a:solidFill>
@@ -2692,7 +2788,7 @@
         <a:buFontTx/>
         <a:buNone/>
         <a:tabLst/>
-        <a:defRPr b="0" baseline="0" cap="none" i="0" spc="0" strike="noStrike" sz="1600" u="none">
+        <a:defRPr sz="1600" b="0" i="0" u="none" strike="noStrike" cap="none" spc="0" baseline="0">
           <a:solidFill>
             <a:schemeClr val="tx1"/>
           </a:solidFill>
@@ -2718,7 +2814,7 @@
         <a:buFontTx/>
         <a:buNone/>
         <a:tabLst/>
-        <a:defRPr b="0" baseline="0" cap="none" i="0" spc="0" strike="noStrike" sz="1600" u="none">
+        <a:defRPr sz="1600" b="0" i="0" u="none" strike="noStrike" cap="none" spc="0" baseline="0">
           <a:solidFill>
             <a:schemeClr val="tx1"/>
           </a:solidFill>
@@ -2744,7 +2840,7 @@
         <a:buFontTx/>
         <a:buNone/>
         <a:tabLst/>
-        <a:defRPr b="0" baseline="0" cap="none" i="0" spc="0" strike="noStrike" sz="1600" u="none">
+        <a:defRPr sz="1600" b="0" i="0" u="none" strike="noStrike" cap="none" spc="0" baseline="0">
           <a:solidFill>
             <a:schemeClr val="tx1"/>
           </a:solidFill>
@@ -2770,7 +2866,7 @@
         <a:buFontTx/>
         <a:buNone/>
         <a:tabLst/>
-        <a:defRPr b="0" baseline="0" cap="none" i="0" spc="0" strike="noStrike" sz="1600" u="none">
+        <a:defRPr sz="1600" b="0" i="0" u="none" strike="noStrike" cap="none" spc="0" baseline="0">
           <a:solidFill>
             <a:schemeClr val="tx1"/>
           </a:solidFill>
@@ -2796,7 +2892,7 @@
         <a:buFontTx/>
         <a:buNone/>
         <a:tabLst/>
-        <a:defRPr b="0" baseline="0" cap="none" i="0" spc="0" strike="noStrike" sz="1600" u="none">
+        <a:defRPr sz="1600" b="0" i="0" u="none" strike="noStrike" cap="none" spc="0" baseline="0">
           <a:solidFill>
             <a:schemeClr val="tx1"/>
           </a:solidFill>
@@ -2822,7 +2918,7 @@
         <a:buFontTx/>
         <a:buNone/>
         <a:tabLst/>
-        <a:defRPr b="0" baseline="0" cap="none" i="0" spc="0" strike="noStrike" sz="1600" u="none">
+        <a:defRPr sz="1600" b="0" i="0" u="none" strike="noStrike" cap="none" spc="0" baseline="0">
           <a:solidFill>
             <a:schemeClr val="tx1"/>
           </a:solidFill>
@@ -2848,7 +2944,7 @@
         <a:buFontTx/>
         <a:buNone/>
         <a:tabLst/>
-        <a:defRPr b="0" baseline="0" cap="none" i="0" spc="0" strike="noStrike" sz="1600" u="none">
+        <a:defRPr sz="1600" b="0" i="0" u="none" strike="noStrike" cap="none" spc="0" baseline="0">
           <a:solidFill>
             <a:schemeClr val="tx1"/>
           </a:solidFill>
@@ -2874,7 +2970,7 @@
         <a:buFontTx/>
         <a:buNone/>
         <a:tabLst/>
-        <a:defRPr b="0" baseline="0" cap="none" i="0" spc="0" strike="noStrike" sz="1600" u="none">
+        <a:defRPr sz="1600" b="0" i="0" u="none" strike="noStrike" cap="none" spc="0" baseline="0">
           <a:solidFill>
             <a:schemeClr val="tx1"/>
           </a:solidFill>
@@ -2900,7 +2996,7 @@
         <a:buFontTx/>
         <a:buNone/>
         <a:tabLst/>
-        <a:defRPr b="0" baseline="0" cap="none" i="0" spc="0" strike="noStrike" sz="1600" u="none">
+        <a:defRPr sz="1600" b="0" i="0" u="none" strike="noStrike" cap="none" spc="0" baseline="0">
           <a:solidFill>
             <a:schemeClr val="tx1"/>
           </a:solidFill>
@@ -2917,7 +3013,7 @@
 </file>
 
 <file path=ppt/slides/slide1.xml><?xml version="1.0" encoding="utf-8"?>
-<p:sld xmlns:a="http://schemas.openxmlformats.org/drawingml/2006/main" xmlns:r="http://schemas.openxmlformats.org/officeDocument/2006/relationships" xmlns:p="http://schemas.openxmlformats.org/presentationml/2006/main" xmlns:m="http://schemas.openxmlformats.org/officeDocument/2006/math" xmlns:a14="http://schemas.microsoft.com/office/drawing/2010/main" showMasterSp="1" showMasterPhAnim="1">
+<p:sld xmlns:a="http://schemas.openxmlformats.org/drawingml/2006/main" xmlns:r="http://schemas.openxmlformats.org/officeDocument/2006/relationships" xmlns:p="http://schemas.openxmlformats.org/presentationml/2006/main">
   <p:cSld>
     <p:spTree>
       <p:nvGrpSpPr>
@@ -2936,7 +3032,9 @@
       <p:sp>
         <p:nvSpPr>
           <p:cNvPr id="119" name="Team H Demo"/>
-          <p:cNvSpPr txBox="1"/>
+          <p:cNvSpPr txBox="1">
+            <a:spLocks noGrp="1"/>
+          </p:cNvSpPr>
           <p:nvPr>
             <p:ph type="ctrTitle"/>
           </p:nvPr>
@@ -2954,7 +3052,6 @@
             </a:lvl1pPr>
           </a:lstStyle>
           <a:p>
-            <a:pPr/>
             <a:r>
               <a:t>Team H Demo</a:t>
             </a:r>
@@ -2964,7 +3061,9 @@
       <p:sp>
         <p:nvSpPr>
           <p:cNvPr id="120" name="Sprint #3"/>
-          <p:cNvSpPr txBox="1"/>
+          <p:cNvSpPr txBox="1">
+            <a:spLocks noGrp="1"/>
+          </p:cNvSpPr>
           <p:nvPr>
             <p:ph type="subTitle" sz="quarter" idx="1"/>
           </p:nvPr>
@@ -2982,7 +3081,6 @@
             </a:lvl1pPr>
           </a:lstStyle>
           <a:p>
-            <a:pPr/>
             <a:r>
               <a:t>Sprint #3</a:t>
             </a:r>
@@ -2994,12 +3092,12 @@
   <p:clrMapOvr>
     <a:masterClrMapping/>
   </p:clrMapOvr>
-  <p:transition xmlns:p14="http://schemas.microsoft.com/office/powerpoint/2010/main" spd="med" advClick="1"/>
+  <p:transition spd="med"/>
 </p:sld>
 </file>
 
 <file path=ppt/slides/slide10.xml><?xml version="1.0" encoding="utf-8"?>
-<p:sld xmlns:a="http://schemas.openxmlformats.org/drawingml/2006/main" xmlns:r="http://schemas.openxmlformats.org/officeDocument/2006/relationships" xmlns:p="http://schemas.openxmlformats.org/presentationml/2006/main" xmlns:m="http://schemas.openxmlformats.org/officeDocument/2006/math" xmlns:a14="http://schemas.microsoft.com/office/drawing/2010/main" showMasterSp="1" showMasterPhAnim="1">
+<p:sld xmlns:a="http://schemas.openxmlformats.org/drawingml/2006/main" xmlns:r="http://schemas.openxmlformats.org/officeDocument/2006/relationships" xmlns:p="http://schemas.openxmlformats.org/presentationml/2006/main">
   <p:cSld>
     <p:spTree>
       <p:nvGrpSpPr>
@@ -3018,7 +3116,9 @@
       <p:sp>
         <p:nvSpPr>
           <p:cNvPr id="146" name="“As a teacher I want to provide a list time slots available for parent meetings so that I can speak with them.”"/>
-          <p:cNvSpPr txBox="1"/>
+          <p:cNvSpPr txBox="1">
+            <a:spLocks noGrp="1"/>
+          </p:cNvSpPr>
           <p:nvPr>
             <p:ph type="body" idx="14"/>
           </p:nvPr>
@@ -3036,7 +3136,7 @@
           <a:bodyPr/>
           <a:lstStyle>
             <a:lvl1pPr>
-              <a:defRPr i="1" sz="5000">
+              <a:defRPr sz="5000" i="1">
                 <a:latin typeface="Helvetica Neue"/>
                 <a:ea typeface="Helvetica Neue"/>
                 <a:cs typeface="Helvetica Neue"/>
@@ -3045,7 +3145,6 @@
             </a:lvl1pPr>
           </a:lstStyle>
           <a:p>
-            <a:pPr/>
             <a:r>
               <a:t>“As a teacher I want to provide a list time slots available for parent meetings so that I can speak with them.”</a:t>
             </a:r>
@@ -3071,7 +3170,7 @@
           </a:ln>
           <a:extLst>
             <a:ext uri="{C572A759-6A51-4108-AA02-DFA0A04FC94B}">
-              <ma14:wrappingTextBoxFlag xmlns:ma14="http://schemas.microsoft.com/office/mac/drawingml/2011/main" val="1"/>
+              <ma14:wrappingTextBoxFlag xmlns:ma14="http://schemas.microsoft.com/office/mac/drawingml/2011/main" xmlns:a14="http://schemas.microsoft.com/office/drawing/2010/main" xmlns:m="http://schemas.openxmlformats.org/officeDocument/2006/math" xmlns="" val="1"/>
             </a:ext>
           </a:extLst>
         </p:spPr>
@@ -3085,7 +3184,6 @@
             </a:lvl1pPr>
           </a:lstStyle>
           <a:p>
-            <a:pPr/>
             <a:r>
               <a:t>Story 21</a:t>
             </a:r>
@@ -3097,130 +3195,12 @@
   <p:clrMapOvr>
     <a:masterClrMapping/>
   </p:clrMapOvr>
-  <p:transition xmlns:p14="http://schemas.microsoft.com/office/powerpoint/2010/main" spd="med" advClick="1"/>
-</p:sld>
-</file>
-
-<file path=ppt/slides/slide11.xml><?xml version="1.0" encoding="utf-8"?>
-<p:sld xmlns:a="http://schemas.openxmlformats.org/drawingml/2006/main" xmlns:r="http://schemas.openxmlformats.org/officeDocument/2006/relationships" xmlns:p="http://schemas.openxmlformats.org/presentationml/2006/main" xmlns:m="http://schemas.openxmlformats.org/officeDocument/2006/math" xmlns:a14="http://schemas.microsoft.com/office/drawing/2010/main" showMasterSp="1" showMasterPhAnim="1">
-  <p:cSld>
-    <p:spTree>
-      <p:nvGrpSpPr>
-        <p:cNvPr id="1" name=""/>
-        <p:cNvGrpSpPr/>
-        <p:nvPr/>
-      </p:nvGrpSpPr>
-      <p:grpSpPr>
-        <a:xfrm>
-          <a:off x="0" y="0"/>
-          <a:ext cx="0" cy="0"/>
-          <a:chOff x="0" y="0"/>
-          <a:chExt cx="0" cy="0"/>
-        </a:xfrm>
-      </p:grpSpPr>
-      <p:sp>
-        <p:nvSpPr>
-          <p:cNvPr id="149" name="(Stories #7 and #11) Feature Request: add the possibility to upload files together with assignments.…"/>
-          <p:cNvSpPr txBox="1"/>
-          <p:nvPr>
-            <p:ph type="body" idx="14"/>
-          </p:nvPr>
-        </p:nvSpPr>
-        <p:spPr>
-          <a:xfrm>
-            <a:off x="1270000" y="3283967"/>
-            <a:ext cx="10464800" cy="2576066"/>
-          </a:xfrm>
-          <a:prstGeom prst="rect">
-            <a:avLst/>
-          </a:prstGeom>
-        </p:spPr>
-        <p:txBody>
-          <a:bodyPr/>
-          <a:lstStyle/>
-          <a:p>
-            <a:pPr marL="694531" indent="-694531" algn="l">
-              <a:buSzPct val="145000"/>
-              <a:buChar char="•"/>
-              <a:defRPr i="1" sz="4000">
-                <a:latin typeface="Helvetica Neue"/>
-                <a:ea typeface="Helvetica Neue"/>
-                <a:cs typeface="Helvetica Neue"/>
-                <a:sym typeface="Helvetica Neue"/>
-              </a:defRPr>
-            </a:pPr>
-            <a:r>
-              <a:t>(Stories #7 and #11) Feature Request: add the possibility to upload files together with assignments.</a:t>
-            </a:r>
-          </a:p>
-          <a:p>
-            <a:pPr marL="694531" indent="-694531" algn="l">
-              <a:buSzPct val="145000"/>
-              <a:buChar char="•"/>
-              <a:defRPr i="1" sz="4000">
-                <a:latin typeface="Helvetica Neue"/>
-                <a:ea typeface="Helvetica Neue"/>
-                <a:cs typeface="Helvetica Neue"/>
-                <a:sym typeface="Helvetica Neue"/>
-              </a:defRPr>
-            </a:pPr>
-            <a:r>
-              <a:t>(Story #3 and #4) UI/UX improvement.</a:t>
-            </a:r>
-          </a:p>
-        </p:txBody>
-      </p:sp>
-      <p:sp>
-        <p:nvSpPr>
-          <p:cNvPr id="150" name="Improvements"/>
-          <p:cNvSpPr txBox="1"/>
-          <p:nvPr/>
-        </p:nvSpPr>
-        <p:spPr>
-          <a:xfrm>
-            <a:off x="2095499" y="514962"/>
-            <a:ext cx="8813801" cy="1626862"/>
-          </a:xfrm>
-          <a:prstGeom prst="rect">
-            <a:avLst/>
-          </a:prstGeom>
-          <a:ln w="12700">
-            <a:miter lim="400000"/>
-          </a:ln>
-          <a:extLst>
-            <a:ext uri="{C572A759-6A51-4108-AA02-DFA0A04FC94B}">
-              <ma14:wrappingTextBoxFlag xmlns:ma14="http://schemas.microsoft.com/office/mac/drawingml/2011/main" val="1"/>
-            </a:ext>
-          </a:extLst>
-        </p:spPr>
-        <p:txBody>
-          <a:bodyPr wrap="none" lIns="50800" tIns="50800" rIns="50800" bIns="50800" anchor="ctr">
-            <a:spAutoFit/>
-          </a:bodyPr>
-          <a:lstStyle>
-            <a:lvl1pPr>
-              <a:defRPr sz="10000"/>
-            </a:lvl1pPr>
-          </a:lstStyle>
-          <a:p>
-            <a:pPr/>
-            <a:r>
-              <a:t>Improvements</a:t>
-            </a:r>
-          </a:p>
-        </p:txBody>
-      </p:sp>
-    </p:spTree>
-  </p:cSld>
-  <p:clrMapOvr>
-    <a:masterClrMapping/>
-  </p:clrMapOvr>
-  <p:transition xmlns:p14="http://schemas.microsoft.com/office/powerpoint/2010/main" spd="med" advClick="1"/>
+  <p:transition spd="med"/>
 </p:sld>
 </file>
 
 <file path=ppt/slides/slide2.xml><?xml version="1.0" encoding="utf-8"?>
-<p:sld xmlns:a="http://schemas.openxmlformats.org/drawingml/2006/main" xmlns:r="http://schemas.openxmlformats.org/officeDocument/2006/relationships" xmlns:p="http://schemas.openxmlformats.org/presentationml/2006/main" xmlns:m="http://schemas.openxmlformats.org/officeDocument/2006/math" xmlns:a14="http://schemas.microsoft.com/office/drawing/2010/main" showMasterSp="1" showMasterPhAnim="1">
+<p:sld xmlns:a="http://schemas.openxmlformats.org/drawingml/2006/main" xmlns:r="http://schemas.openxmlformats.org/officeDocument/2006/relationships" xmlns:p="http://schemas.openxmlformats.org/presentationml/2006/main">
   <p:cSld>
     <p:spTree>
       <p:nvGrpSpPr>
@@ -3255,7 +3235,7 @@
           </a:ln>
           <a:extLst>
             <a:ext uri="{C572A759-6A51-4108-AA02-DFA0A04FC94B}">
-              <ma14:wrappingTextBoxFlag xmlns:ma14="http://schemas.microsoft.com/office/mac/drawingml/2011/main" val="1"/>
+              <ma14:wrappingTextBoxFlag xmlns:ma14="http://schemas.microsoft.com/office/mac/drawingml/2011/main" xmlns:a14="http://schemas.microsoft.com/office/drawing/2010/main" xmlns:m="http://schemas.openxmlformats.org/officeDocument/2006/math" xmlns="" val="1"/>
             </a:ext>
           </a:extLst>
         </p:spPr>
@@ -3269,7 +3249,6 @@
             </a:lvl1pPr>
           </a:lstStyle>
           <a:p>
-            <a:pPr/>
             <a:r>
               <a:t>Stories</a:t>
             </a:r>
@@ -3295,7 +3274,7 @@
           </a:ln>
           <a:extLst>
             <a:ext uri="{C572A759-6A51-4108-AA02-DFA0A04FC94B}">
-              <ma14:wrappingTextBoxFlag xmlns:ma14="http://schemas.microsoft.com/office/mac/drawingml/2011/main" val="1"/>
+              <ma14:wrappingTextBoxFlag xmlns:ma14="http://schemas.microsoft.com/office/mac/drawingml/2011/main" xmlns:a14="http://schemas.microsoft.com/office/drawing/2010/main" xmlns:m="http://schemas.openxmlformats.org/officeDocument/2006/math" xmlns="" val="1"/>
             </a:ext>
           </a:extLst>
         </p:spPr>
@@ -3331,12 +3310,12 @@
   <p:clrMapOvr>
     <a:masterClrMapping/>
   </p:clrMapOvr>
-  <p:transition xmlns:p14="http://schemas.microsoft.com/office/powerpoint/2010/main" spd="med" advClick="1"/>
+  <p:transition spd="med"/>
 </p:sld>
 </file>
 
 <file path=ppt/slides/slide3.xml><?xml version="1.0" encoding="utf-8"?>
-<p:sld xmlns:a="http://schemas.openxmlformats.org/drawingml/2006/main" xmlns:r="http://schemas.openxmlformats.org/officeDocument/2006/relationships" xmlns:p="http://schemas.openxmlformats.org/presentationml/2006/main" xmlns:m="http://schemas.openxmlformats.org/officeDocument/2006/math" xmlns:a14="http://schemas.microsoft.com/office/drawing/2010/main" showMasterSp="1" showMasterPhAnim="1">
+<p:sld xmlns:a="http://schemas.openxmlformats.org/drawingml/2006/main" xmlns:r="http://schemas.openxmlformats.org/officeDocument/2006/relationships" xmlns:p="http://schemas.openxmlformats.org/presentationml/2006/main">
   <p:cSld>
     <p:spTree>
       <p:nvGrpSpPr>
@@ -3355,7 +3334,9 @@
       <p:sp>
         <p:nvSpPr>
           <p:cNvPr id="125" name="“As an administrative officer I want to publish the timetable of classes so that teachers and parents can see them.”"/>
-          <p:cNvSpPr txBox="1"/>
+          <p:cNvSpPr txBox="1">
+            <a:spLocks noGrp="1"/>
+          </p:cNvSpPr>
           <p:nvPr>
             <p:ph type="body" idx="14"/>
           </p:nvPr>
@@ -3373,7 +3354,7 @@
           <a:bodyPr/>
           <a:lstStyle>
             <a:lvl1pPr>
-              <a:defRPr i="1" sz="5000">
+              <a:defRPr sz="5000" i="1">
                 <a:latin typeface="Helvetica Neue"/>
                 <a:ea typeface="Helvetica Neue"/>
                 <a:cs typeface="Helvetica Neue"/>
@@ -3382,7 +3363,6 @@
             </a:lvl1pPr>
           </a:lstStyle>
           <a:p>
-            <a:pPr/>
             <a:r>
               <a:t>“As an administrative officer I want to publish the timetable of classes so that teachers and parents can see them.”</a:t>
             </a:r>
@@ -3408,7 +3388,7 @@
           </a:ln>
           <a:extLst>
             <a:ext uri="{C572A759-6A51-4108-AA02-DFA0A04FC94B}">
-              <ma14:wrappingTextBoxFlag xmlns:ma14="http://schemas.microsoft.com/office/mac/drawingml/2011/main" val="1"/>
+              <ma14:wrappingTextBoxFlag xmlns:ma14="http://schemas.microsoft.com/office/mac/drawingml/2011/main" xmlns:a14="http://schemas.microsoft.com/office/drawing/2010/main" xmlns:m="http://schemas.openxmlformats.org/officeDocument/2006/math" xmlns="" val="1"/>
             </a:ext>
           </a:extLst>
         </p:spPr>
@@ -3422,7 +3402,6 @@
             </a:lvl1pPr>
           </a:lstStyle>
           <a:p>
-            <a:pPr/>
             <a:r>
               <a:t>Story 14</a:t>
             </a:r>
@@ -3434,12 +3413,12 @@
   <p:clrMapOvr>
     <a:masterClrMapping/>
   </p:clrMapOvr>
-  <p:transition xmlns:p14="http://schemas.microsoft.com/office/powerpoint/2010/main" spd="med" advClick="1"/>
+  <p:transition spd="med"/>
 </p:sld>
 </file>
 
 <file path=ppt/slides/slide4.xml><?xml version="1.0" encoding="utf-8"?>
-<p:sld xmlns:a="http://schemas.openxmlformats.org/drawingml/2006/main" xmlns:r="http://schemas.openxmlformats.org/officeDocument/2006/relationships" xmlns:p="http://schemas.openxmlformats.org/presentationml/2006/main" xmlns:m="http://schemas.openxmlformats.org/officeDocument/2006/math" xmlns:a14="http://schemas.microsoft.com/office/drawing/2010/main" showMasterSp="1" showMasterPhAnim="1">
+<p:sld xmlns:a="http://schemas.openxmlformats.org/drawingml/2006/main" xmlns:r="http://schemas.openxmlformats.org/officeDocument/2006/relationships" xmlns:p="http://schemas.openxmlformats.org/presentationml/2006/main">
   <p:cSld>
     <p:spTree>
       <p:nvGrpSpPr>
@@ -3458,7 +3437,9 @@
       <p:sp>
         <p:nvSpPr>
           <p:cNvPr id="128" name="“As a teacher I want to publish the support material so that students can access it.”"/>
-          <p:cNvSpPr txBox="1"/>
+          <p:cNvSpPr txBox="1">
+            <a:spLocks noGrp="1"/>
+          </p:cNvSpPr>
           <p:nvPr>
             <p:ph type="body" idx="14"/>
           </p:nvPr>
@@ -3476,7 +3457,7 @@
           <a:bodyPr/>
           <a:lstStyle>
             <a:lvl1pPr>
-              <a:defRPr i="1" sz="5000">
+              <a:defRPr sz="5000" i="1">
                 <a:latin typeface="Helvetica Neue"/>
                 <a:ea typeface="Helvetica Neue"/>
                 <a:cs typeface="Helvetica Neue"/>
@@ -3485,7 +3466,6 @@
             </a:lvl1pPr>
           </a:lstStyle>
           <a:p>
-            <a:pPr/>
             <a:r>
               <a:t>“As a teacher I want to publish the support material so that students can access it.”</a:t>
             </a:r>
@@ -3511,7 +3491,7 @@
           </a:ln>
           <a:extLst>
             <a:ext uri="{C572A759-6A51-4108-AA02-DFA0A04FC94B}">
-              <ma14:wrappingTextBoxFlag xmlns:ma14="http://schemas.microsoft.com/office/mac/drawingml/2011/main" val="1"/>
+              <ma14:wrappingTextBoxFlag xmlns:ma14="http://schemas.microsoft.com/office/mac/drawingml/2011/main" xmlns:a14="http://schemas.microsoft.com/office/drawing/2010/main" xmlns:m="http://schemas.openxmlformats.org/officeDocument/2006/math" xmlns="" val="1"/>
             </a:ext>
           </a:extLst>
         </p:spPr>
@@ -3525,7 +3505,6 @@
             </a:lvl1pPr>
           </a:lstStyle>
           <a:p>
-            <a:pPr/>
             <a:r>
               <a:t>Story 15</a:t>
             </a:r>
@@ -3537,12 +3516,12 @@
   <p:clrMapOvr>
     <a:masterClrMapping/>
   </p:clrMapOvr>
-  <p:transition xmlns:p14="http://schemas.microsoft.com/office/powerpoint/2010/main" spd="med" advClick="1"/>
+  <p:transition spd="med"/>
 </p:sld>
 </file>
 
 <file path=ppt/slides/slide5.xml><?xml version="1.0" encoding="utf-8"?>
-<p:sld xmlns:a="http://schemas.openxmlformats.org/drawingml/2006/main" xmlns:r="http://schemas.openxmlformats.org/officeDocument/2006/relationships" xmlns:p="http://schemas.openxmlformats.org/presentationml/2006/main" xmlns:m="http://schemas.openxmlformats.org/officeDocument/2006/math" xmlns:a14="http://schemas.microsoft.com/office/drawing/2010/main" showMasterSp="1" showMasterPhAnim="1">
+<p:sld xmlns:a="http://schemas.openxmlformats.org/drawingml/2006/main" xmlns:r="http://schemas.openxmlformats.org/officeDocument/2006/relationships" xmlns:p="http://schemas.openxmlformats.org/presentationml/2006/main">
   <p:cSld>
     <p:spTree>
       <p:nvGrpSpPr>
@@ -3561,7 +3540,9 @@
       <p:sp>
         <p:nvSpPr>
           <p:cNvPr id="131" name="“As a parent I want to download the support material so that my child can study it.”"/>
-          <p:cNvSpPr txBox="1"/>
+          <p:cNvSpPr txBox="1">
+            <a:spLocks noGrp="1"/>
+          </p:cNvSpPr>
           <p:nvPr>
             <p:ph type="body" idx="14"/>
           </p:nvPr>
@@ -3579,7 +3560,7 @@
           <a:bodyPr/>
           <a:lstStyle>
             <a:lvl1pPr>
-              <a:defRPr i="1" sz="5000">
+              <a:defRPr sz="5000" i="1">
                 <a:latin typeface="Helvetica Neue"/>
                 <a:ea typeface="Helvetica Neue"/>
                 <a:cs typeface="Helvetica Neue"/>
@@ -3588,7 +3569,6 @@
             </a:lvl1pPr>
           </a:lstStyle>
           <a:p>
-            <a:pPr/>
             <a:r>
               <a:t>“As a parent I want to download the support material so that my child can study it.”</a:t>
             </a:r>
@@ -3614,7 +3594,7 @@
           </a:ln>
           <a:extLst>
             <a:ext uri="{C572A759-6A51-4108-AA02-DFA0A04FC94B}">
-              <ma14:wrappingTextBoxFlag xmlns:ma14="http://schemas.microsoft.com/office/mac/drawingml/2011/main" val="1"/>
+              <ma14:wrappingTextBoxFlag xmlns:ma14="http://schemas.microsoft.com/office/mac/drawingml/2011/main" xmlns:a14="http://schemas.microsoft.com/office/drawing/2010/main" xmlns:m="http://schemas.openxmlformats.org/officeDocument/2006/math" xmlns="" val="1"/>
             </a:ext>
           </a:extLst>
         </p:spPr>
@@ -3628,7 +3608,6 @@
             </a:lvl1pPr>
           </a:lstStyle>
           <a:p>
-            <a:pPr/>
             <a:r>
               <a:t>Story 16</a:t>
             </a:r>
@@ -3640,12 +3619,12 @@
   <p:clrMapOvr>
     <a:masterClrMapping/>
   </p:clrMapOvr>
-  <p:transition xmlns:p14="http://schemas.microsoft.com/office/powerpoint/2010/main" spd="med" advClick="1"/>
+  <p:transition spd="med"/>
 </p:sld>
 </file>
 
 <file path=ppt/slides/slide6.xml><?xml version="1.0" encoding="utf-8"?>
-<p:sld xmlns:a="http://schemas.openxmlformats.org/drawingml/2006/main" xmlns:r="http://schemas.openxmlformats.org/officeDocument/2006/relationships" xmlns:p="http://schemas.openxmlformats.org/presentationml/2006/main" xmlns:m="http://schemas.openxmlformats.org/officeDocument/2006/math" xmlns:a14="http://schemas.microsoft.com/office/drawing/2010/main" showMasterSp="1" showMasterPhAnim="1">
+<p:sld xmlns:a="http://schemas.openxmlformats.org/drawingml/2006/main" xmlns:r="http://schemas.openxmlformats.org/officeDocument/2006/relationships" xmlns:p="http://schemas.openxmlformats.org/presentationml/2006/main">
   <p:cSld>
     <p:spTree>
       <p:nvGrpSpPr>
@@ -3664,7 +3643,9 @@
       <p:sp>
         <p:nvSpPr>
           <p:cNvPr id="134" name="“As a parent I want to read the official communications so that I can be informed on the school activities.”"/>
-          <p:cNvSpPr txBox="1"/>
+          <p:cNvSpPr txBox="1">
+            <a:spLocks noGrp="1"/>
+          </p:cNvSpPr>
           <p:nvPr>
             <p:ph type="body" idx="14"/>
           </p:nvPr>
@@ -3682,7 +3663,7 @@
           <a:bodyPr/>
           <a:lstStyle>
             <a:lvl1pPr>
-              <a:defRPr i="1" sz="5000">
+              <a:defRPr sz="5000" i="1">
                 <a:latin typeface="Helvetica Neue"/>
                 <a:ea typeface="Helvetica Neue"/>
                 <a:cs typeface="Helvetica Neue"/>
@@ -3691,7 +3672,6 @@
             </a:lvl1pPr>
           </a:lstStyle>
           <a:p>
-            <a:pPr/>
             <a:r>
               <a:t>“As a parent I want to read the official communications so that I can be informed on the school activities.”</a:t>
             </a:r>
@@ -3717,7 +3697,7 @@
           </a:ln>
           <a:extLst>
             <a:ext uri="{C572A759-6A51-4108-AA02-DFA0A04FC94B}">
-              <ma14:wrappingTextBoxFlag xmlns:ma14="http://schemas.microsoft.com/office/mac/drawingml/2011/main" val="1"/>
+              <ma14:wrappingTextBoxFlag xmlns:ma14="http://schemas.microsoft.com/office/mac/drawingml/2011/main" xmlns:a14="http://schemas.microsoft.com/office/drawing/2010/main" xmlns:m="http://schemas.openxmlformats.org/officeDocument/2006/math" xmlns="" val="1"/>
             </a:ext>
           </a:extLst>
         </p:spPr>
@@ -3731,7 +3711,6 @@
             </a:lvl1pPr>
           </a:lstStyle>
           <a:p>
-            <a:pPr/>
             <a:r>
               <a:t>Story 17</a:t>
             </a:r>
@@ -3743,12 +3722,12 @@
   <p:clrMapOvr>
     <a:masterClrMapping/>
   </p:clrMapOvr>
-  <p:transition xmlns:p14="http://schemas.microsoft.com/office/powerpoint/2010/main" spd="med" advClick="1"/>
+  <p:transition spd="med"/>
 </p:sld>
 </file>
 
 <file path=ppt/slides/slide7.xml><?xml version="1.0" encoding="utf-8"?>
-<p:sld xmlns:a="http://schemas.openxmlformats.org/drawingml/2006/main" xmlns:r="http://schemas.openxmlformats.org/officeDocument/2006/relationships" xmlns:p="http://schemas.openxmlformats.org/presentationml/2006/main" xmlns:m="http://schemas.openxmlformats.org/officeDocument/2006/math" xmlns:a14="http://schemas.microsoft.com/office/drawing/2010/main" showMasterSp="1" showMasterPhAnim="1">
+<p:sld xmlns:a="http://schemas.openxmlformats.org/drawingml/2006/main" xmlns:r="http://schemas.openxmlformats.org/officeDocument/2006/relationships" xmlns:p="http://schemas.openxmlformats.org/presentationml/2006/main">
   <p:cSld>
     <p:spTree>
       <p:nvGrpSpPr>
@@ -3767,7 +3746,9 @@
       <p:sp>
         <p:nvSpPr>
           <p:cNvPr id="137" name="“As a teacher I want to write a note to parents so that I can signal inappropriate behaviors.”"/>
-          <p:cNvSpPr txBox="1"/>
+          <p:cNvSpPr txBox="1">
+            <a:spLocks noGrp="1"/>
+          </p:cNvSpPr>
           <p:nvPr>
             <p:ph type="body" idx="14"/>
           </p:nvPr>
@@ -3785,7 +3766,7 @@
           <a:bodyPr/>
           <a:lstStyle>
             <a:lvl1pPr>
-              <a:defRPr i="1" sz="5000">
+              <a:defRPr sz="5000" i="1">
                 <a:latin typeface="Helvetica Neue"/>
                 <a:ea typeface="Helvetica Neue"/>
                 <a:cs typeface="Helvetica Neue"/>
@@ -3794,7 +3775,6 @@
             </a:lvl1pPr>
           </a:lstStyle>
           <a:p>
-            <a:pPr/>
             <a:r>
               <a:t>“As a teacher I want to write a note to parents so that I can signal inappropriate behaviors.”</a:t>
             </a:r>
@@ -3820,7 +3800,7 @@
           </a:ln>
           <a:extLst>
             <a:ext uri="{C572A759-6A51-4108-AA02-DFA0A04FC94B}">
-              <ma14:wrappingTextBoxFlag xmlns:ma14="http://schemas.microsoft.com/office/mac/drawingml/2011/main" val="1"/>
+              <ma14:wrappingTextBoxFlag xmlns:ma14="http://schemas.microsoft.com/office/mac/drawingml/2011/main" xmlns:a14="http://schemas.microsoft.com/office/drawing/2010/main" xmlns:m="http://schemas.openxmlformats.org/officeDocument/2006/math" xmlns="" val="1"/>
             </a:ext>
           </a:extLst>
         </p:spPr>
@@ -3834,7 +3814,6 @@
             </a:lvl1pPr>
           </a:lstStyle>
           <a:p>
-            <a:pPr/>
             <a:r>
               <a:t>Story 18</a:t>
             </a:r>
@@ -3846,12 +3825,12 @@
   <p:clrMapOvr>
     <a:masterClrMapping/>
   </p:clrMapOvr>
-  <p:transition xmlns:p14="http://schemas.microsoft.com/office/powerpoint/2010/main" spd="med" advClick="1"/>
+  <p:transition spd="med"/>
 </p:sld>
 </file>
 
 <file path=ppt/slides/slide8.xml><?xml version="1.0" encoding="utf-8"?>
-<p:sld xmlns:a="http://schemas.openxmlformats.org/drawingml/2006/main" xmlns:r="http://schemas.openxmlformats.org/officeDocument/2006/relationships" xmlns:p="http://schemas.openxmlformats.org/presentationml/2006/main" xmlns:m="http://schemas.openxmlformats.org/officeDocument/2006/math" xmlns:a14="http://schemas.microsoft.com/office/drawing/2010/main" showMasterSp="1" showMasterPhAnim="1">
+<p:sld xmlns:a="http://schemas.openxmlformats.org/drawingml/2006/main" xmlns:r="http://schemas.openxmlformats.org/officeDocument/2006/relationships" xmlns:p="http://schemas.openxmlformats.org/presentationml/2006/main">
   <p:cSld>
     <p:spTree>
       <p:nvGrpSpPr>
@@ -3870,7 +3849,9 @@
       <p:sp>
         <p:nvSpPr>
           <p:cNvPr id="140" name="“As a parent I want to access the notes to parents so that I can monitor my child's behavior.”"/>
-          <p:cNvSpPr txBox="1"/>
+          <p:cNvSpPr txBox="1">
+            <a:spLocks noGrp="1"/>
+          </p:cNvSpPr>
           <p:nvPr>
             <p:ph type="body" idx="14"/>
           </p:nvPr>
@@ -3888,7 +3869,7 @@
           <a:bodyPr/>
           <a:lstStyle>
             <a:lvl1pPr>
-              <a:defRPr i="1" sz="5000">
+              <a:defRPr sz="5000" i="1">
                 <a:latin typeface="Helvetica Neue"/>
                 <a:ea typeface="Helvetica Neue"/>
                 <a:cs typeface="Helvetica Neue"/>
@@ -3897,7 +3878,6 @@
             </a:lvl1pPr>
           </a:lstStyle>
           <a:p>
-            <a:pPr/>
             <a:r>
               <a:t>“As a parent I want to access the notes to parents so that I can monitor my child's behavior.”</a:t>
             </a:r>
@@ -3923,7 +3903,7 @@
           </a:ln>
           <a:extLst>
             <a:ext uri="{C572A759-6A51-4108-AA02-DFA0A04FC94B}">
-              <ma14:wrappingTextBoxFlag xmlns:ma14="http://schemas.microsoft.com/office/mac/drawingml/2011/main" val="1"/>
+              <ma14:wrappingTextBoxFlag xmlns:ma14="http://schemas.microsoft.com/office/mac/drawingml/2011/main" xmlns:a14="http://schemas.microsoft.com/office/drawing/2010/main" xmlns:m="http://schemas.openxmlformats.org/officeDocument/2006/math" xmlns="" val="1"/>
             </a:ext>
           </a:extLst>
         </p:spPr>
@@ -3937,7 +3917,6 @@
             </a:lvl1pPr>
           </a:lstStyle>
           <a:p>
-            <a:pPr/>
             <a:r>
               <a:t>Story 19</a:t>
             </a:r>
@@ -3949,12 +3928,12 @@
   <p:clrMapOvr>
     <a:masterClrMapping/>
   </p:clrMapOvr>
-  <p:transition xmlns:p14="http://schemas.microsoft.com/office/powerpoint/2010/main" spd="med" advClick="1"/>
+  <p:transition spd="med"/>
 </p:sld>
 </file>
 
 <file path=ppt/slides/slide9.xml><?xml version="1.0" encoding="utf-8"?>
-<p:sld xmlns:a="http://schemas.openxmlformats.org/drawingml/2006/main" xmlns:r="http://schemas.openxmlformats.org/officeDocument/2006/relationships" xmlns:p="http://schemas.openxmlformats.org/presentationml/2006/main" xmlns:m="http://schemas.openxmlformats.org/officeDocument/2006/math" xmlns:a14="http://schemas.microsoft.com/office/drawing/2010/main" showMasterSp="1" showMasterPhAnim="1">
+<p:sld xmlns:a="http://schemas.openxmlformats.org/drawingml/2006/main" xmlns:r="http://schemas.openxmlformats.org/officeDocument/2006/relationships" xmlns:p="http://schemas.openxmlformats.org/presentationml/2006/main">
   <p:cSld>
     <p:spTree>
       <p:nvGrpSpPr>
@@ -3973,7 +3952,9 @@
       <p:sp>
         <p:nvSpPr>
           <p:cNvPr id="143" name="“As a class coordinating teacher I want to publish the final grades of the term.”"/>
-          <p:cNvSpPr txBox="1"/>
+          <p:cNvSpPr txBox="1">
+            <a:spLocks noGrp="1"/>
+          </p:cNvSpPr>
           <p:nvPr>
             <p:ph type="body" idx="14"/>
           </p:nvPr>
@@ -3991,7 +3972,7 @@
           <a:bodyPr/>
           <a:lstStyle>
             <a:lvl1pPr>
-              <a:defRPr i="1" sz="5000">
+              <a:defRPr sz="5000" i="1">
                 <a:latin typeface="Helvetica Neue"/>
                 <a:ea typeface="Helvetica Neue"/>
                 <a:cs typeface="Helvetica Neue"/>
@@ -4000,7 +3981,6 @@
             </a:lvl1pPr>
           </a:lstStyle>
           <a:p>
-            <a:pPr/>
             <a:r>
               <a:t>“As a class coordinating teacher I want to publish the final grades of the term.”</a:t>
             </a:r>
@@ -4026,7 +4006,7 @@
           </a:ln>
           <a:extLst>
             <a:ext uri="{C572A759-6A51-4108-AA02-DFA0A04FC94B}">
-              <ma14:wrappingTextBoxFlag xmlns:ma14="http://schemas.microsoft.com/office/mac/drawingml/2011/main" val="1"/>
+              <ma14:wrappingTextBoxFlag xmlns:ma14="http://schemas.microsoft.com/office/mac/drawingml/2011/main" xmlns:a14="http://schemas.microsoft.com/office/drawing/2010/main" xmlns:m="http://schemas.openxmlformats.org/officeDocument/2006/math" xmlns="" val="1"/>
             </a:ext>
           </a:extLst>
         </p:spPr>
@@ -4040,7 +4020,6 @@
             </a:lvl1pPr>
           </a:lstStyle>
           <a:p>
-            <a:pPr/>
             <a:r>
               <a:t>Story 20</a:t>
             </a:r>
@@ -4052,12 +4031,12 @@
   <p:clrMapOvr>
     <a:masterClrMapping/>
   </p:clrMapOvr>
-  <p:transition xmlns:p14="http://schemas.microsoft.com/office/powerpoint/2010/main" spd="med" advClick="1"/>
+  <p:transition spd="med"/>
 </p:sld>
 </file>
 
 <file path=ppt/theme/theme1.xml><?xml version="1.0" encoding="utf-8"?>
-<a:theme xmlns:a="http://schemas.openxmlformats.org/drawingml/2006/main" xmlns:r="http://schemas.openxmlformats.org/officeDocument/2006/relationships" name="White">
+<a:theme xmlns:a="http://schemas.openxmlformats.org/drawingml/2006/main" name="White">
   <a:themeElements>
     <a:clrScheme name="White">
       <a:dk1>
@@ -4256,7 +4235,7 @@
         <a:effectLst/>
         <a:sp3d/>
       </a:spPr>
-      <a:bodyPr rot="0" spcFirstLastPara="1" vertOverflow="overflow" horzOverflow="overflow" vert="horz" wrap="square" lIns="50800" tIns="50800" rIns="50800" bIns="50800" numCol="1" spcCol="38100" rtlCol="0" anchor="ctr" upright="0">
+      <a:bodyPr rot="0" spcFirstLastPara="1" vertOverflow="overflow" horzOverflow="overflow" vert="horz" wrap="square" lIns="50800" tIns="50800" rIns="50800" bIns="50800" numCol="1" spcCol="38100" rtlCol="0" anchor="ctr">
         <a:spAutoFit/>
       </a:bodyPr>
       <a:lstStyle>
@@ -4275,7 +4254,7 @@
           <a:buFontTx/>
           <a:buNone/>
           <a:tabLst/>
-          <a:defRPr b="0" baseline="0" cap="none" i="0" spc="0" strike="noStrike" sz="2200" u="none" kumimoji="0" normalizeH="0">
+          <a:defRPr kumimoji="0" sz="2200" b="0" i="0" u="none" strike="noStrike" cap="none" spc="0" normalizeH="0" baseline="0">
             <a:ln>
               <a:noFill/>
             </a:ln>
@@ -4305,7 +4284,7 @@
           <a:buFontTx/>
           <a:buNone/>
           <a:tabLst/>
-          <a:defRPr b="0" baseline="0" cap="none" i="0" spc="0" strike="noStrike" sz="1800" u="none" kumimoji="0" normalizeH="0">
+          <a:defRPr kumimoji="0" sz="1800" b="0" i="0" u="none" strike="noStrike" cap="none" spc="0" normalizeH="0" baseline="0">
             <a:ln>
               <a:noFill/>
             </a:ln>
@@ -4331,7 +4310,7 @@
           <a:buFontTx/>
           <a:buNone/>
           <a:tabLst/>
-          <a:defRPr b="0" baseline="0" cap="none" i="0" spc="0" strike="noStrike" sz="1800" u="none" kumimoji="0" normalizeH="0">
+          <a:defRPr kumimoji="0" sz="1800" b="0" i="0" u="none" strike="noStrike" cap="none" spc="0" normalizeH="0" baseline="0">
             <a:ln>
               <a:noFill/>
             </a:ln>
@@ -4357,7 +4336,7 @@
           <a:buFontTx/>
           <a:buNone/>
           <a:tabLst/>
-          <a:defRPr b="0" baseline="0" cap="none" i="0" spc="0" strike="noStrike" sz="1800" u="none" kumimoji="0" normalizeH="0">
+          <a:defRPr kumimoji="0" sz="1800" b="0" i="0" u="none" strike="noStrike" cap="none" spc="0" normalizeH="0" baseline="0">
             <a:ln>
               <a:noFill/>
             </a:ln>
@@ -4383,7 +4362,7 @@
           <a:buFontTx/>
           <a:buNone/>
           <a:tabLst/>
-          <a:defRPr b="0" baseline="0" cap="none" i="0" spc="0" strike="noStrike" sz="1800" u="none" kumimoji="0" normalizeH="0">
+          <a:defRPr kumimoji="0" sz="1800" b="0" i="0" u="none" strike="noStrike" cap="none" spc="0" normalizeH="0" baseline="0">
             <a:ln>
               <a:noFill/>
             </a:ln>
@@ -4409,7 +4388,7 @@
           <a:buFontTx/>
           <a:buNone/>
           <a:tabLst/>
-          <a:defRPr b="0" baseline="0" cap="none" i="0" spc="0" strike="noStrike" sz="1800" u="none" kumimoji="0" normalizeH="0">
+          <a:defRPr kumimoji="0" sz="1800" b="0" i="0" u="none" strike="noStrike" cap="none" spc="0" normalizeH="0" baseline="0">
             <a:ln>
               <a:noFill/>
             </a:ln>
@@ -4435,7 +4414,7 @@
           <a:buFontTx/>
           <a:buNone/>
           <a:tabLst/>
-          <a:defRPr b="0" baseline="0" cap="none" i="0" spc="0" strike="noStrike" sz="1800" u="none" kumimoji="0" normalizeH="0">
+          <a:defRPr kumimoji="0" sz="1800" b="0" i="0" u="none" strike="noStrike" cap="none" spc="0" normalizeH="0" baseline="0">
             <a:ln>
               <a:noFill/>
             </a:ln>
@@ -4461,7 +4440,7 @@
           <a:buFontTx/>
           <a:buNone/>
           <a:tabLst/>
-          <a:defRPr b="0" baseline="0" cap="none" i="0" spc="0" strike="noStrike" sz="1800" u="none" kumimoji="0" normalizeH="0">
+          <a:defRPr kumimoji="0" sz="1800" b="0" i="0" u="none" strike="noStrike" cap="none" spc="0" normalizeH="0" baseline="0">
             <a:ln>
               <a:noFill/>
             </a:ln>
@@ -4487,7 +4466,7 @@
           <a:buFontTx/>
           <a:buNone/>
           <a:tabLst/>
-          <a:defRPr b="0" baseline="0" cap="none" i="0" spc="0" strike="noStrike" sz="1800" u="none" kumimoji="0" normalizeH="0">
+          <a:defRPr kumimoji="0" sz="1800" b="0" i="0" u="none" strike="noStrike" cap="none" spc="0" normalizeH="0" baseline="0">
             <a:ln>
               <a:noFill/>
             </a:ln>
@@ -4513,7 +4492,7 @@
           <a:buFontTx/>
           <a:buNone/>
           <a:tabLst/>
-          <a:defRPr b="0" baseline="0" cap="none" i="0" spc="0" strike="noStrike" sz="1800" u="none" kumimoji="0" normalizeH="0">
+          <a:defRPr kumimoji="0" sz="1800" b="0" i="0" u="none" strike="noStrike" cap="none" spc="0" normalizeH="0" baseline="0">
             <a:ln>
               <a:noFill/>
             </a:ln>
@@ -4526,9 +4505,15 @@
         </a:lvl9pPr>
       </a:lstStyle>
       <a:style>
-        <a:lnRef idx="0"/>
-        <a:fillRef idx="0"/>
-        <a:effectRef idx="0"/>
+        <a:lnRef idx="0">
+          <a:scrgbClr r="0" g="0" b="0"/>
+        </a:lnRef>
+        <a:fillRef idx="0">
+          <a:scrgbClr r="0" g="0" b="0"/>
+        </a:fillRef>
+        <a:effectRef idx="0">
+          <a:scrgbClr r="0" g="0" b="0"/>
+        </a:effectRef>
         <a:fontRef idx="none"/>
       </a:style>
     </a:spDef>
@@ -4545,7 +4530,7 @@
         <a:effectLst/>
         <a:sp3d/>
       </a:spPr>
-      <a:bodyPr rot="0" spcFirstLastPara="1" vertOverflow="overflow" horzOverflow="overflow" vert="horz" wrap="square" lIns="91439" tIns="45719" rIns="91439" bIns="45719" numCol="1" spcCol="38100" rtlCol="0" anchor="t" upright="0">
+      <a:bodyPr rot="0" spcFirstLastPara="1" vertOverflow="overflow" horzOverflow="overflow" vert="horz" wrap="square" lIns="91439" tIns="45719" rIns="91439" bIns="45719" numCol="1" spcCol="38100" rtlCol="0" anchor="t">
         <a:noAutofit/>
       </a:bodyPr>
       <a:lstStyle>
@@ -4564,7 +4549,7 @@
           <a:buFontTx/>
           <a:buNone/>
           <a:tabLst/>
-          <a:defRPr b="0" baseline="0" cap="none" i="0" spc="0" strike="noStrike" sz="1800" u="none" kumimoji="0" normalizeH="0">
+          <a:defRPr kumimoji="0" sz="1800" b="0" i="0" u="none" strike="noStrike" cap="none" spc="0" normalizeH="0" baseline="0">
             <a:ln>
               <a:noFill/>
             </a:ln>
@@ -4590,7 +4575,7 @@
           <a:buFontTx/>
           <a:buNone/>
           <a:tabLst/>
-          <a:defRPr b="0" baseline="0" cap="none" i="0" spc="0" strike="noStrike" sz="1800" u="none" kumimoji="0" normalizeH="0">
+          <a:defRPr kumimoji="0" sz="1800" b="0" i="0" u="none" strike="noStrike" cap="none" spc="0" normalizeH="0" baseline="0">
             <a:ln>
               <a:noFill/>
             </a:ln>
@@ -4616,7 +4601,7 @@
           <a:buFontTx/>
           <a:buNone/>
           <a:tabLst/>
-          <a:defRPr b="0" baseline="0" cap="none" i="0" spc="0" strike="noStrike" sz="1800" u="none" kumimoji="0" normalizeH="0">
+          <a:defRPr kumimoji="0" sz="1800" b="0" i="0" u="none" strike="noStrike" cap="none" spc="0" normalizeH="0" baseline="0">
             <a:ln>
               <a:noFill/>
             </a:ln>
@@ -4642,7 +4627,7 @@
           <a:buFontTx/>
           <a:buNone/>
           <a:tabLst/>
-          <a:defRPr b="0" baseline="0" cap="none" i="0" spc="0" strike="noStrike" sz="1800" u="none" kumimoji="0" normalizeH="0">
+          <a:defRPr kumimoji="0" sz="1800" b="0" i="0" u="none" strike="noStrike" cap="none" spc="0" normalizeH="0" baseline="0">
             <a:ln>
               <a:noFill/>
             </a:ln>
@@ -4668,7 +4653,7 @@
           <a:buFontTx/>
           <a:buNone/>
           <a:tabLst/>
-          <a:defRPr b="0" baseline="0" cap="none" i="0" spc="0" strike="noStrike" sz="1800" u="none" kumimoji="0" normalizeH="0">
+          <a:defRPr kumimoji="0" sz="1800" b="0" i="0" u="none" strike="noStrike" cap="none" spc="0" normalizeH="0" baseline="0">
             <a:ln>
               <a:noFill/>
             </a:ln>
@@ -4694,7 +4679,7 @@
           <a:buFontTx/>
           <a:buNone/>
           <a:tabLst/>
-          <a:defRPr b="0" baseline="0" cap="none" i="0" spc="0" strike="noStrike" sz="1800" u="none" kumimoji="0" normalizeH="0">
+          <a:defRPr kumimoji="0" sz="1800" b="0" i="0" u="none" strike="noStrike" cap="none" spc="0" normalizeH="0" baseline="0">
             <a:ln>
               <a:noFill/>
             </a:ln>
@@ -4720,7 +4705,7 @@
           <a:buFontTx/>
           <a:buNone/>
           <a:tabLst/>
-          <a:defRPr b="0" baseline="0" cap="none" i="0" spc="0" strike="noStrike" sz="1800" u="none" kumimoji="0" normalizeH="0">
+          <a:defRPr kumimoji="0" sz="1800" b="0" i="0" u="none" strike="noStrike" cap="none" spc="0" normalizeH="0" baseline="0">
             <a:ln>
               <a:noFill/>
             </a:ln>
@@ -4746,7 +4731,7 @@
           <a:buFontTx/>
           <a:buNone/>
           <a:tabLst/>
-          <a:defRPr b="0" baseline="0" cap="none" i="0" spc="0" strike="noStrike" sz="1800" u="none" kumimoji="0" normalizeH="0">
+          <a:defRPr kumimoji="0" sz="1800" b="0" i="0" u="none" strike="noStrike" cap="none" spc="0" normalizeH="0" baseline="0">
             <a:ln>
               <a:noFill/>
             </a:ln>
@@ -4772,7 +4757,7 @@
           <a:buFontTx/>
           <a:buNone/>
           <a:tabLst/>
-          <a:defRPr b="0" baseline="0" cap="none" i="0" spc="0" strike="noStrike" sz="1800" u="none" kumimoji="0" normalizeH="0">
+          <a:defRPr kumimoji="0" sz="1800" b="0" i="0" u="none" strike="noStrike" cap="none" spc="0" normalizeH="0" baseline="0">
             <a:ln>
               <a:noFill/>
             </a:ln>
@@ -4798,7 +4783,7 @@
           <a:buFontTx/>
           <a:buNone/>
           <a:tabLst/>
-          <a:defRPr b="0" baseline="0" cap="none" i="0" spc="0" strike="noStrike" sz="1800" u="none" kumimoji="0" normalizeH="0">
+          <a:defRPr kumimoji="0" sz="1800" b="0" i="0" u="none" strike="noStrike" cap="none" spc="0" normalizeH="0" baseline="0">
             <a:ln>
               <a:noFill/>
             </a:ln>
@@ -4811,9 +4796,15 @@
         </a:lvl9pPr>
       </a:lstStyle>
       <a:style>
-        <a:lnRef idx="0"/>
-        <a:fillRef idx="0"/>
-        <a:effectRef idx="0"/>
+        <a:lnRef idx="0">
+          <a:scrgbClr r="0" g="0" b="0"/>
+        </a:lnRef>
+        <a:fillRef idx="0">
+          <a:scrgbClr r="0" g="0" b="0"/>
+        </a:fillRef>
+        <a:effectRef idx="0">
+          <a:scrgbClr r="0" g="0" b="0"/>
+        </a:effectRef>
         <a:fontRef idx="none"/>
       </a:style>
     </a:lnDef>
@@ -4827,7 +4818,7 @@
         <a:effectLst/>
         <a:sp3d/>
       </a:spPr>
-      <a:bodyPr rot="0" spcFirstLastPara="1" vertOverflow="overflow" horzOverflow="overflow" vert="horz" wrap="square" lIns="50800" tIns="50800" rIns="50800" bIns="50800" numCol="1" spcCol="38100" rtlCol="0" anchor="ctr" upright="0">
+      <a:bodyPr rot="0" spcFirstLastPara="1" vertOverflow="overflow" horzOverflow="overflow" vert="horz" wrap="square" lIns="50800" tIns="50800" rIns="50800" bIns="50800" numCol="1" spcCol="38100" rtlCol="0" anchor="ctr">
         <a:spAutoFit/>
       </a:bodyPr>
       <a:lstStyle>
@@ -4846,7 +4837,7 @@
           <a:buFontTx/>
           <a:buNone/>
           <a:tabLst/>
-          <a:defRPr b="1" baseline="0" cap="none" i="0" spc="0" strike="noStrike" sz="2400" u="none" kumimoji="0" normalizeH="0">
+          <a:defRPr kumimoji="0" sz="2400" b="1" i="0" u="none" strike="noStrike" cap="none" spc="0" normalizeH="0" baseline="0">
             <a:ln>
               <a:noFill/>
             </a:ln>
@@ -4876,7 +4867,7 @@
           <a:buFontTx/>
           <a:buNone/>
           <a:tabLst/>
-          <a:defRPr b="0" baseline="0" cap="none" i="0" spc="0" strike="noStrike" sz="1800" u="none" kumimoji="0" normalizeH="0">
+          <a:defRPr kumimoji="0" sz="1800" b="0" i="0" u="none" strike="noStrike" cap="none" spc="0" normalizeH="0" baseline="0">
             <a:ln>
               <a:noFill/>
             </a:ln>
@@ -4902,7 +4893,7 @@
           <a:buFontTx/>
           <a:buNone/>
           <a:tabLst/>
-          <a:defRPr b="0" baseline="0" cap="none" i="0" spc="0" strike="noStrike" sz="1800" u="none" kumimoji="0" normalizeH="0">
+          <a:defRPr kumimoji="0" sz="1800" b="0" i="0" u="none" strike="noStrike" cap="none" spc="0" normalizeH="0" baseline="0">
             <a:ln>
               <a:noFill/>
             </a:ln>
@@ -4928,7 +4919,7 @@
           <a:buFontTx/>
           <a:buNone/>
           <a:tabLst/>
-          <a:defRPr b="0" baseline="0" cap="none" i="0" spc="0" strike="noStrike" sz="1800" u="none" kumimoji="0" normalizeH="0">
+          <a:defRPr kumimoji="0" sz="1800" b="0" i="0" u="none" strike="noStrike" cap="none" spc="0" normalizeH="0" baseline="0">
             <a:ln>
               <a:noFill/>
             </a:ln>
@@ -4954,7 +4945,7 @@
           <a:buFontTx/>
           <a:buNone/>
           <a:tabLst/>
-          <a:defRPr b="0" baseline="0" cap="none" i="0" spc="0" strike="noStrike" sz="1800" u="none" kumimoji="0" normalizeH="0">
+          <a:defRPr kumimoji="0" sz="1800" b="0" i="0" u="none" strike="noStrike" cap="none" spc="0" normalizeH="0" baseline="0">
             <a:ln>
               <a:noFill/>
             </a:ln>
@@ -4980,7 +4971,7 @@
           <a:buFontTx/>
           <a:buNone/>
           <a:tabLst/>
-          <a:defRPr b="0" baseline="0" cap="none" i="0" spc="0" strike="noStrike" sz="1800" u="none" kumimoji="0" normalizeH="0">
+          <a:defRPr kumimoji="0" sz="1800" b="0" i="0" u="none" strike="noStrike" cap="none" spc="0" normalizeH="0" baseline="0">
             <a:ln>
               <a:noFill/>
             </a:ln>
@@ -5006,7 +4997,7 @@
           <a:buFontTx/>
           <a:buNone/>
           <a:tabLst/>
-          <a:defRPr b="0" baseline="0" cap="none" i="0" spc="0" strike="noStrike" sz="1800" u="none" kumimoji="0" normalizeH="0">
+          <a:defRPr kumimoji="0" sz="1800" b="0" i="0" u="none" strike="noStrike" cap="none" spc="0" normalizeH="0" baseline="0">
             <a:ln>
               <a:noFill/>
             </a:ln>
@@ -5032,7 +5023,7 @@
           <a:buFontTx/>
           <a:buNone/>
           <a:tabLst/>
-          <a:defRPr b="0" baseline="0" cap="none" i="0" spc="0" strike="noStrike" sz="1800" u="none" kumimoji="0" normalizeH="0">
+          <a:defRPr kumimoji="0" sz="1800" b="0" i="0" u="none" strike="noStrike" cap="none" spc="0" normalizeH="0" baseline="0">
             <a:ln>
               <a:noFill/>
             </a:ln>
@@ -5058,7 +5049,7 @@
           <a:buFontTx/>
           <a:buNone/>
           <a:tabLst/>
-          <a:defRPr b="0" baseline="0" cap="none" i="0" spc="0" strike="noStrike" sz="1800" u="none" kumimoji="0" normalizeH="0">
+          <a:defRPr kumimoji="0" sz="1800" b="0" i="0" u="none" strike="noStrike" cap="none" spc="0" normalizeH="0" baseline="0">
             <a:ln>
               <a:noFill/>
             </a:ln>
@@ -5084,7 +5075,7 @@
           <a:buFontTx/>
           <a:buNone/>
           <a:tabLst/>
-          <a:defRPr b="0" baseline="0" cap="none" i="0" spc="0" strike="noStrike" sz="1800" u="none" kumimoji="0" normalizeH="0">
+          <a:defRPr kumimoji="0" sz="1800" b="0" i="0" u="none" strike="noStrike" cap="none" spc="0" normalizeH="0" baseline="0">
             <a:ln>
               <a:noFill/>
             </a:ln>
@@ -5097,18 +5088,25 @@
         </a:lvl9pPr>
       </a:lstStyle>
       <a:style>
-        <a:lnRef idx="0"/>
-        <a:fillRef idx="0"/>
-        <a:effectRef idx="0"/>
+        <a:lnRef idx="0">
+          <a:scrgbClr r="0" g="0" b="0"/>
+        </a:lnRef>
+        <a:fillRef idx="0">
+          <a:scrgbClr r="0" g="0" b="0"/>
+        </a:fillRef>
+        <a:effectRef idx="0">
+          <a:scrgbClr r="0" g="0" b="0"/>
+        </a:effectRef>
         <a:fontRef idx="none"/>
       </a:style>
     </a:txDef>
   </a:objectDefaults>
+  <a:extraClrSchemeLst/>
 </a:theme>
 </file>
 
 <file path=ppt/theme/theme2.xml><?xml version="1.0" encoding="utf-8"?>
-<a:theme xmlns:a="http://schemas.openxmlformats.org/drawingml/2006/main" xmlns:r="http://schemas.openxmlformats.org/officeDocument/2006/relationships" name="White">
+<a:theme xmlns:a="http://schemas.openxmlformats.org/drawingml/2006/main" name="White">
   <a:themeElements>
     <a:clrScheme name="White">
       <a:dk1>
@@ -5307,7 +5305,7 @@
         <a:effectLst/>
         <a:sp3d/>
       </a:spPr>
-      <a:bodyPr rot="0" spcFirstLastPara="1" vertOverflow="overflow" horzOverflow="overflow" vert="horz" wrap="square" lIns="50800" tIns="50800" rIns="50800" bIns="50800" numCol="1" spcCol="38100" rtlCol="0" anchor="ctr" upright="0">
+      <a:bodyPr rot="0" spcFirstLastPara="1" vertOverflow="overflow" horzOverflow="overflow" vert="horz" wrap="square" lIns="50800" tIns="50800" rIns="50800" bIns="50800" numCol="1" spcCol="38100" rtlCol="0" anchor="ctr">
         <a:spAutoFit/>
       </a:bodyPr>
       <a:lstStyle>
@@ -5326,7 +5324,7 @@
           <a:buFontTx/>
           <a:buNone/>
           <a:tabLst/>
-          <a:defRPr b="0" baseline="0" cap="none" i="0" spc="0" strike="noStrike" sz="2200" u="none" kumimoji="0" normalizeH="0">
+          <a:defRPr kumimoji="0" sz="2200" b="0" i="0" u="none" strike="noStrike" cap="none" spc="0" normalizeH="0" baseline="0">
             <a:ln>
               <a:noFill/>
             </a:ln>
@@ -5356,7 +5354,7 @@
           <a:buFontTx/>
           <a:buNone/>
           <a:tabLst/>
-          <a:defRPr b="0" baseline="0" cap="none" i="0" spc="0" strike="noStrike" sz="1800" u="none" kumimoji="0" normalizeH="0">
+          <a:defRPr kumimoji="0" sz="1800" b="0" i="0" u="none" strike="noStrike" cap="none" spc="0" normalizeH="0" baseline="0">
             <a:ln>
               <a:noFill/>
             </a:ln>
@@ -5382,7 +5380,7 @@
           <a:buFontTx/>
           <a:buNone/>
           <a:tabLst/>
-          <a:defRPr b="0" baseline="0" cap="none" i="0" spc="0" strike="noStrike" sz="1800" u="none" kumimoji="0" normalizeH="0">
+          <a:defRPr kumimoji="0" sz="1800" b="0" i="0" u="none" strike="noStrike" cap="none" spc="0" normalizeH="0" baseline="0">
             <a:ln>
               <a:noFill/>
             </a:ln>
@@ -5408,7 +5406,7 @@
           <a:buFontTx/>
           <a:buNone/>
           <a:tabLst/>
-          <a:defRPr b="0" baseline="0" cap="none" i="0" spc="0" strike="noStrike" sz="1800" u="none" kumimoji="0" normalizeH="0">
+          <a:defRPr kumimoji="0" sz="1800" b="0" i="0" u="none" strike="noStrike" cap="none" spc="0" normalizeH="0" baseline="0">
             <a:ln>
               <a:noFill/>
             </a:ln>
@@ -5434,7 +5432,7 @@
           <a:buFontTx/>
           <a:buNone/>
           <a:tabLst/>
-          <a:defRPr b="0" baseline="0" cap="none" i="0" spc="0" strike="noStrike" sz="1800" u="none" kumimoji="0" normalizeH="0">
+          <a:defRPr kumimoji="0" sz="1800" b="0" i="0" u="none" strike="noStrike" cap="none" spc="0" normalizeH="0" baseline="0">
             <a:ln>
               <a:noFill/>
             </a:ln>
@@ -5460,7 +5458,7 @@
           <a:buFontTx/>
           <a:buNone/>
           <a:tabLst/>
-          <a:defRPr b="0" baseline="0" cap="none" i="0" spc="0" strike="noStrike" sz="1800" u="none" kumimoji="0" normalizeH="0">
+          <a:defRPr kumimoji="0" sz="1800" b="0" i="0" u="none" strike="noStrike" cap="none" spc="0" normalizeH="0" baseline="0">
             <a:ln>
               <a:noFill/>
             </a:ln>
@@ -5486,7 +5484,7 @@
           <a:buFontTx/>
           <a:buNone/>
           <a:tabLst/>
-          <a:defRPr b="0" baseline="0" cap="none" i="0" spc="0" strike="noStrike" sz="1800" u="none" kumimoji="0" normalizeH="0">
+          <a:defRPr kumimoji="0" sz="1800" b="0" i="0" u="none" strike="noStrike" cap="none" spc="0" normalizeH="0" baseline="0">
             <a:ln>
               <a:noFill/>
             </a:ln>
@@ -5512,7 +5510,7 @@
           <a:buFontTx/>
           <a:buNone/>
           <a:tabLst/>
-          <a:defRPr b="0" baseline="0" cap="none" i="0" spc="0" strike="noStrike" sz="1800" u="none" kumimoji="0" normalizeH="0">
+          <a:defRPr kumimoji="0" sz="1800" b="0" i="0" u="none" strike="noStrike" cap="none" spc="0" normalizeH="0" baseline="0">
             <a:ln>
               <a:noFill/>
             </a:ln>
@@ -5538,7 +5536,7 @@
           <a:buFontTx/>
           <a:buNone/>
           <a:tabLst/>
-          <a:defRPr b="0" baseline="0" cap="none" i="0" spc="0" strike="noStrike" sz="1800" u="none" kumimoji="0" normalizeH="0">
+          <a:defRPr kumimoji="0" sz="1800" b="0" i="0" u="none" strike="noStrike" cap="none" spc="0" normalizeH="0" baseline="0">
             <a:ln>
               <a:noFill/>
             </a:ln>
@@ -5564,7 +5562,7 @@
           <a:buFontTx/>
           <a:buNone/>
           <a:tabLst/>
-          <a:defRPr b="0" baseline="0" cap="none" i="0" spc="0" strike="noStrike" sz="1800" u="none" kumimoji="0" normalizeH="0">
+          <a:defRPr kumimoji="0" sz="1800" b="0" i="0" u="none" strike="noStrike" cap="none" spc="0" normalizeH="0" baseline="0">
             <a:ln>
               <a:noFill/>
             </a:ln>
@@ -5577,9 +5575,15 @@
         </a:lvl9pPr>
       </a:lstStyle>
       <a:style>
-        <a:lnRef idx="0"/>
-        <a:fillRef idx="0"/>
-        <a:effectRef idx="0"/>
+        <a:lnRef idx="0">
+          <a:scrgbClr r="0" g="0" b="0"/>
+        </a:lnRef>
+        <a:fillRef idx="0">
+          <a:scrgbClr r="0" g="0" b="0"/>
+        </a:fillRef>
+        <a:effectRef idx="0">
+          <a:scrgbClr r="0" g="0" b="0"/>
+        </a:effectRef>
         <a:fontRef idx="none"/>
       </a:style>
     </a:spDef>
@@ -5596,7 +5600,7 @@
         <a:effectLst/>
         <a:sp3d/>
       </a:spPr>
-      <a:bodyPr rot="0" spcFirstLastPara="1" vertOverflow="overflow" horzOverflow="overflow" vert="horz" wrap="square" lIns="91439" tIns="45719" rIns="91439" bIns="45719" numCol="1" spcCol="38100" rtlCol="0" anchor="t" upright="0">
+      <a:bodyPr rot="0" spcFirstLastPara="1" vertOverflow="overflow" horzOverflow="overflow" vert="horz" wrap="square" lIns="91439" tIns="45719" rIns="91439" bIns="45719" numCol="1" spcCol="38100" rtlCol="0" anchor="t">
         <a:noAutofit/>
       </a:bodyPr>
       <a:lstStyle>
@@ -5615,7 +5619,7 @@
           <a:buFontTx/>
           <a:buNone/>
           <a:tabLst/>
-          <a:defRPr b="0" baseline="0" cap="none" i="0" spc="0" strike="noStrike" sz="1800" u="none" kumimoji="0" normalizeH="0">
+          <a:defRPr kumimoji="0" sz="1800" b="0" i="0" u="none" strike="noStrike" cap="none" spc="0" normalizeH="0" baseline="0">
             <a:ln>
               <a:noFill/>
             </a:ln>
@@ -5641,7 +5645,7 @@
           <a:buFontTx/>
           <a:buNone/>
           <a:tabLst/>
-          <a:defRPr b="0" baseline="0" cap="none" i="0" spc="0" strike="noStrike" sz="1800" u="none" kumimoji="0" normalizeH="0">
+          <a:defRPr kumimoji="0" sz="1800" b="0" i="0" u="none" strike="noStrike" cap="none" spc="0" normalizeH="0" baseline="0">
             <a:ln>
               <a:noFill/>
             </a:ln>
@@ -5667,7 +5671,7 @@
           <a:buFontTx/>
           <a:buNone/>
           <a:tabLst/>
-          <a:defRPr b="0" baseline="0" cap="none" i="0" spc="0" strike="noStrike" sz="1800" u="none" kumimoji="0" normalizeH="0">
+          <a:defRPr kumimoji="0" sz="1800" b="0" i="0" u="none" strike="noStrike" cap="none" spc="0" normalizeH="0" baseline="0">
             <a:ln>
               <a:noFill/>
             </a:ln>
@@ -5693,7 +5697,7 @@
           <a:buFontTx/>
           <a:buNone/>
           <a:tabLst/>
-          <a:defRPr b="0" baseline="0" cap="none" i="0" spc="0" strike="noStrike" sz="1800" u="none" kumimoji="0" normalizeH="0">
+          <a:defRPr kumimoji="0" sz="1800" b="0" i="0" u="none" strike="noStrike" cap="none" spc="0" normalizeH="0" baseline="0">
             <a:ln>
               <a:noFill/>
             </a:ln>
@@ -5719,7 +5723,7 @@
           <a:buFontTx/>
           <a:buNone/>
           <a:tabLst/>
-          <a:defRPr b="0" baseline="0" cap="none" i="0" spc="0" strike="noStrike" sz="1800" u="none" kumimoji="0" normalizeH="0">
+          <a:defRPr kumimoji="0" sz="1800" b="0" i="0" u="none" strike="noStrike" cap="none" spc="0" normalizeH="0" baseline="0">
             <a:ln>
               <a:noFill/>
             </a:ln>
@@ -5745,7 +5749,7 @@
           <a:buFontTx/>
           <a:buNone/>
           <a:tabLst/>
-          <a:defRPr b="0" baseline="0" cap="none" i="0" spc="0" strike="noStrike" sz="1800" u="none" kumimoji="0" normalizeH="0">
+          <a:defRPr kumimoji="0" sz="1800" b="0" i="0" u="none" strike="noStrike" cap="none" spc="0" normalizeH="0" baseline="0">
             <a:ln>
               <a:noFill/>
             </a:ln>
@@ -5771,7 +5775,7 @@
           <a:buFontTx/>
           <a:buNone/>
           <a:tabLst/>
-          <a:defRPr b="0" baseline="0" cap="none" i="0" spc="0" strike="noStrike" sz="1800" u="none" kumimoji="0" normalizeH="0">
+          <a:defRPr kumimoji="0" sz="1800" b="0" i="0" u="none" strike="noStrike" cap="none" spc="0" normalizeH="0" baseline="0">
             <a:ln>
               <a:noFill/>
             </a:ln>
@@ -5797,7 +5801,7 @@
           <a:buFontTx/>
           <a:buNone/>
           <a:tabLst/>
-          <a:defRPr b="0" baseline="0" cap="none" i="0" spc="0" strike="noStrike" sz="1800" u="none" kumimoji="0" normalizeH="0">
+          <a:defRPr kumimoji="0" sz="1800" b="0" i="0" u="none" strike="noStrike" cap="none" spc="0" normalizeH="0" baseline="0">
             <a:ln>
               <a:noFill/>
             </a:ln>
@@ -5823,7 +5827,7 @@
           <a:buFontTx/>
           <a:buNone/>
           <a:tabLst/>
-          <a:defRPr b="0" baseline="0" cap="none" i="0" spc="0" strike="noStrike" sz="1800" u="none" kumimoji="0" normalizeH="0">
+          <a:defRPr kumimoji="0" sz="1800" b="0" i="0" u="none" strike="noStrike" cap="none" spc="0" normalizeH="0" baseline="0">
             <a:ln>
               <a:noFill/>
             </a:ln>
@@ -5849,7 +5853,7 @@
           <a:buFontTx/>
           <a:buNone/>
           <a:tabLst/>
-          <a:defRPr b="0" baseline="0" cap="none" i="0" spc="0" strike="noStrike" sz="1800" u="none" kumimoji="0" normalizeH="0">
+          <a:defRPr kumimoji="0" sz="1800" b="0" i="0" u="none" strike="noStrike" cap="none" spc="0" normalizeH="0" baseline="0">
             <a:ln>
               <a:noFill/>
             </a:ln>
@@ -5862,9 +5866,15 @@
         </a:lvl9pPr>
       </a:lstStyle>
       <a:style>
-        <a:lnRef idx="0"/>
-        <a:fillRef idx="0"/>
-        <a:effectRef idx="0"/>
+        <a:lnRef idx="0">
+          <a:scrgbClr r="0" g="0" b="0"/>
+        </a:lnRef>
+        <a:fillRef idx="0">
+          <a:scrgbClr r="0" g="0" b="0"/>
+        </a:fillRef>
+        <a:effectRef idx="0">
+          <a:scrgbClr r="0" g="0" b="0"/>
+        </a:effectRef>
         <a:fontRef idx="none"/>
       </a:style>
     </a:lnDef>
@@ -5878,7 +5888,7 @@
         <a:effectLst/>
         <a:sp3d/>
       </a:spPr>
-      <a:bodyPr rot="0" spcFirstLastPara="1" vertOverflow="overflow" horzOverflow="overflow" vert="horz" wrap="square" lIns="50800" tIns="50800" rIns="50800" bIns="50800" numCol="1" spcCol="38100" rtlCol="0" anchor="ctr" upright="0">
+      <a:bodyPr rot="0" spcFirstLastPara="1" vertOverflow="overflow" horzOverflow="overflow" vert="horz" wrap="square" lIns="50800" tIns="50800" rIns="50800" bIns="50800" numCol="1" spcCol="38100" rtlCol="0" anchor="ctr">
         <a:spAutoFit/>
       </a:bodyPr>
       <a:lstStyle>
@@ -5897,7 +5907,7 @@
           <a:buFontTx/>
           <a:buNone/>
           <a:tabLst/>
-          <a:defRPr b="1" baseline="0" cap="none" i="0" spc="0" strike="noStrike" sz="2400" u="none" kumimoji="0" normalizeH="0">
+          <a:defRPr kumimoji="0" sz="2400" b="1" i="0" u="none" strike="noStrike" cap="none" spc="0" normalizeH="0" baseline="0">
             <a:ln>
               <a:noFill/>
             </a:ln>
@@ -5927,7 +5937,7 @@
           <a:buFontTx/>
           <a:buNone/>
           <a:tabLst/>
-          <a:defRPr b="0" baseline="0" cap="none" i="0" spc="0" strike="noStrike" sz="1800" u="none" kumimoji="0" normalizeH="0">
+          <a:defRPr kumimoji="0" sz="1800" b="0" i="0" u="none" strike="noStrike" cap="none" spc="0" normalizeH="0" baseline="0">
             <a:ln>
               <a:noFill/>
             </a:ln>
@@ -5953,7 +5963,7 @@
           <a:buFontTx/>
           <a:buNone/>
           <a:tabLst/>
-          <a:defRPr b="0" baseline="0" cap="none" i="0" spc="0" strike="noStrike" sz="1800" u="none" kumimoji="0" normalizeH="0">
+          <a:defRPr kumimoji="0" sz="1800" b="0" i="0" u="none" strike="noStrike" cap="none" spc="0" normalizeH="0" baseline="0">
             <a:ln>
               <a:noFill/>
             </a:ln>
@@ -5979,7 +5989,7 @@
           <a:buFontTx/>
           <a:buNone/>
           <a:tabLst/>
-          <a:defRPr b="0" baseline="0" cap="none" i="0" spc="0" strike="noStrike" sz="1800" u="none" kumimoji="0" normalizeH="0">
+          <a:defRPr kumimoji="0" sz="1800" b="0" i="0" u="none" strike="noStrike" cap="none" spc="0" normalizeH="0" baseline="0">
             <a:ln>
               <a:noFill/>
             </a:ln>
@@ -6005,7 +6015,7 @@
           <a:buFontTx/>
           <a:buNone/>
           <a:tabLst/>
-          <a:defRPr b="0" baseline="0" cap="none" i="0" spc="0" strike="noStrike" sz="1800" u="none" kumimoji="0" normalizeH="0">
+          <a:defRPr kumimoji="0" sz="1800" b="0" i="0" u="none" strike="noStrike" cap="none" spc="0" normalizeH="0" baseline="0">
             <a:ln>
               <a:noFill/>
             </a:ln>
@@ -6031,7 +6041,7 @@
           <a:buFontTx/>
           <a:buNone/>
           <a:tabLst/>
-          <a:defRPr b="0" baseline="0" cap="none" i="0" spc="0" strike="noStrike" sz="1800" u="none" kumimoji="0" normalizeH="0">
+          <a:defRPr kumimoji="0" sz="1800" b="0" i="0" u="none" strike="noStrike" cap="none" spc="0" normalizeH="0" baseline="0">
             <a:ln>
               <a:noFill/>
             </a:ln>
@@ -6057,7 +6067,7 @@
           <a:buFontTx/>
           <a:buNone/>
           <a:tabLst/>
-          <a:defRPr b="0" baseline="0" cap="none" i="0" spc="0" strike="noStrike" sz="1800" u="none" kumimoji="0" normalizeH="0">
+          <a:defRPr kumimoji="0" sz="1800" b="0" i="0" u="none" strike="noStrike" cap="none" spc="0" normalizeH="0" baseline="0">
             <a:ln>
               <a:noFill/>
             </a:ln>
@@ -6083,7 +6093,7 @@
           <a:buFontTx/>
           <a:buNone/>
           <a:tabLst/>
-          <a:defRPr b="0" baseline="0" cap="none" i="0" spc="0" strike="noStrike" sz="1800" u="none" kumimoji="0" normalizeH="0">
+          <a:defRPr kumimoji="0" sz="1800" b="0" i="0" u="none" strike="noStrike" cap="none" spc="0" normalizeH="0" baseline="0">
             <a:ln>
               <a:noFill/>
             </a:ln>
@@ -6109,7 +6119,7 @@
           <a:buFontTx/>
           <a:buNone/>
           <a:tabLst/>
-          <a:defRPr b="0" baseline="0" cap="none" i="0" spc="0" strike="noStrike" sz="1800" u="none" kumimoji="0" normalizeH="0">
+          <a:defRPr kumimoji="0" sz="1800" b="0" i="0" u="none" strike="noStrike" cap="none" spc="0" normalizeH="0" baseline="0">
             <a:ln>
               <a:noFill/>
             </a:ln>
@@ -6135,7 +6145,7 @@
           <a:buFontTx/>
           <a:buNone/>
           <a:tabLst/>
-          <a:defRPr b="0" baseline="0" cap="none" i="0" spc="0" strike="noStrike" sz="1800" u="none" kumimoji="0" normalizeH="0">
+          <a:defRPr kumimoji="0" sz="1800" b="0" i="0" u="none" strike="noStrike" cap="none" spc="0" normalizeH="0" baseline="0">
             <a:ln>
               <a:noFill/>
             </a:ln>
@@ -6148,12 +6158,19 @@
         </a:lvl9pPr>
       </a:lstStyle>
       <a:style>
-        <a:lnRef idx="0"/>
-        <a:fillRef idx="0"/>
-        <a:effectRef idx="0"/>
+        <a:lnRef idx="0">
+          <a:scrgbClr r="0" g="0" b="0"/>
+        </a:lnRef>
+        <a:fillRef idx="0">
+          <a:scrgbClr r="0" g="0" b="0"/>
+        </a:fillRef>
+        <a:effectRef idx="0">
+          <a:scrgbClr r="0" g="0" b="0"/>
+        </a:effectRef>
         <a:fontRef idx="none"/>
       </a:style>
     </a:txDef>
   </a:objectDefaults>
+  <a:extraClrSchemeLst/>
 </a:theme>
 </file>
</xml_diff>